<commit_message>
Add new files via uploaded
</commit_message>
<xml_diff>
--- a/WE IN 마소 해커톤.pptx
+++ b/WE IN 마소 해커톤.pptx
@@ -15,9 +15,13 @@
     <p:sldId id="286" r:id="rId9"/>
     <p:sldId id="262" r:id="rId10"/>
     <p:sldId id="263" r:id="rId11"/>
-    <p:sldId id="260" r:id="rId12"/>
-    <p:sldId id="282" r:id="rId13"/>
-    <p:sldId id="285" r:id="rId14"/>
+    <p:sldId id="288" r:id="rId12"/>
+    <p:sldId id="289" r:id="rId13"/>
+    <p:sldId id="290" r:id="rId14"/>
+    <p:sldId id="291" r:id="rId15"/>
+    <p:sldId id="260" r:id="rId16"/>
+    <p:sldId id="282" r:id="rId17"/>
+    <p:sldId id="285" r:id="rId18"/>
   </p:sldIdLst>
   <p:sldSz cx="12192000" cy="6858000"/>
   <p:notesSz cx="6858000" cy="9144000"/>
@@ -4074,7 +4078,7 @@
         </p:nvCxnSpPr>
         <p:spPr>
           <a:xfrm>
-            <a:off x="1483360" y="2956560"/>
+            <a:off x="1483360" y="2413635"/>
             <a:ext cx="10708640" cy="0"/>
           </a:xfrm>
           <a:prstGeom prst="line">
@@ -4117,7 +4121,7 @@
         </p:nvCxnSpPr>
         <p:spPr>
           <a:xfrm>
-            <a:off x="1483360" y="4848013"/>
+            <a:off x="1483360" y="3885988"/>
             <a:ext cx="10708640" cy="0"/>
           </a:xfrm>
           <a:prstGeom prst="line">
@@ -4158,7 +4162,7 @@
         </p:nvSpPr>
         <p:spPr>
           <a:xfrm>
-            <a:off x="1521113" y="1993057"/>
+            <a:off x="1521113" y="1602532"/>
             <a:ext cx="609462" cy="369332"/>
           </a:xfrm>
           <a:prstGeom prst="rect">
@@ -4194,7 +4198,7 @@
         </p:nvSpPr>
         <p:spPr>
           <a:xfrm>
-            <a:off x="2371718" y="1993057"/>
+            <a:off x="2371718" y="1602532"/>
             <a:ext cx="447558" cy="369332"/>
           </a:xfrm>
           <a:prstGeom prst="rect">
@@ -4230,8 +4234,141 @@
         </p:nvSpPr>
         <p:spPr>
           <a:xfrm>
-            <a:off x="3060418" y="1946891"/>
+            <a:off x="3060418" y="1556366"/>
             <a:ext cx="6597933" cy="461665"/>
+          </a:xfrm>
+          <a:prstGeom prst="rect">
+            <a:avLst/>
+          </a:prstGeom>
+          <a:noFill/>
+        </p:spPr>
+        <p:txBody>
+          <a:bodyPr wrap="square" rtlCol="0">
+            <a:spAutoFit/>
+          </a:bodyPr>
+          <a:lstStyle/>
+          <a:p>
+            <a:r>
+              <a:rPr lang="ko-KR" altLang="en-US" sz="2400" spc="-150" dirty="0">
+                <a:solidFill>
+                  <a:schemeClr val="accent2"/>
+                </a:solidFill>
+                <a:latin typeface="+mj-ea"/>
+                <a:ea typeface="+mj-ea"/>
+              </a:rPr>
+              <a:t>로그인</a:t>
+            </a:r>
+            <a:r>
+              <a:rPr lang="en-US" altLang="ko-KR" sz="2400" spc="-150" dirty="0">
+                <a:solidFill>
+                  <a:schemeClr val="accent2"/>
+                </a:solidFill>
+                <a:latin typeface="+mj-ea"/>
+                <a:ea typeface="+mj-ea"/>
+              </a:rPr>
+              <a:t>, </a:t>
+            </a:r>
+            <a:r>
+              <a:rPr lang="ko-KR" altLang="en-US" sz="2400" spc="-150" dirty="0">
+                <a:solidFill>
+                  <a:schemeClr val="accent2"/>
+                </a:solidFill>
+                <a:latin typeface="+mj-ea"/>
+                <a:ea typeface="+mj-ea"/>
+              </a:rPr>
+              <a:t>회원가입 서비스</a:t>
+            </a:r>
+          </a:p>
+        </p:txBody>
+      </p:sp>
+      <p:sp>
+        <p:nvSpPr>
+          <p:cNvPr id="22" name="TextBox 21">
+            <a:extLst>
+              <a:ext uri="{FF2B5EF4-FFF2-40B4-BE49-F238E27FC236}">
+                <a16:creationId xmlns:a16="http://schemas.microsoft.com/office/drawing/2014/main" id="{B3921B81-C796-4BD8-A372-18E09CFFB595}"/>
+              </a:ext>
+            </a:extLst>
+          </p:cNvPr>
+          <p:cNvSpPr txBox="1"/>
+          <p:nvPr/>
+        </p:nvSpPr>
+        <p:spPr>
+          <a:xfrm>
+            <a:off x="1521112" y="2974670"/>
+            <a:ext cx="655949" cy="369332"/>
+          </a:xfrm>
+          <a:prstGeom prst="rect">
+            <a:avLst/>
+          </a:prstGeom>
+          <a:noFill/>
+        </p:spPr>
+        <p:txBody>
+          <a:bodyPr wrap="none" rtlCol="0">
+            <a:spAutoFit/>
+          </a:bodyPr>
+          <a:lstStyle/>
+          <a:p>
+            <a:r>
+              <a:rPr lang="en-US" altLang="ko-KR" dirty="0"/>
+              <a:t>002</a:t>
+            </a:r>
+            <a:endParaRPr lang="ko-KR" altLang="en-US" dirty="0"/>
+          </a:p>
+        </p:txBody>
+      </p:sp>
+      <p:sp>
+        <p:nvSpPr>
+          <p:cNvPr id="23" name="TextBox 22">
+            <a:extLst>
+              <a:ext uri="{FF2B5EF4-FFF2-40B4-BE49-F238E27FC236}">
+                <a16:creationId xmlns:a16="http://schemas.microsoft.com/office/drawing/2014/main" id="{6598FF87-5FC5-41F1-A935-8518D0B49166}"/>
+              </a:ext>
+            </a:extLst>
+          </p:cNvPr>
+          <p:cNvSpPr txBox="1"/>
+          <p:nvPr/>
+        </p:nvSpPr>
+        <p:spPr>
+          <a:xfrm>
+            <a:off x="2371717" y="2974670"/>
+            <a:ext cx="447558" cy="369332"/>
+          </a:xfrm>
+          <a:prstGeom prst="rect">
+            <a:avLst/>
+          </a:prstGeom>
+          <a:noFill/>
+        </p:spPr>
+        <p:txBody>
+          <a:bodyPr wrap="none" rtlCol="0">
+            <a:spAutoFit/>
+          </a:bodyPr>
+          <a:lstStyle/>
+          <a:p>
+            <a:r>
+              <a:rPr lang="en-US" altLang="ko-KR" dirty="0"/>
+              <a:t>&gt;&gt;</a:t>
+            </a:r>
+            <a:endParaRPr lang="ko-KR" altLang="en-US" dirty="0"/>
+          </a:p>
+        </p:txBody>
+      </p:sp>
+      <p:sp>
+        <p:nvSpPr>
+          <p:cNvPr id="24" name="TextBox 23">
+            <a:extLst>
+              <a:ext uri="{FF2B5EF4-FFF2-40B4-BE49-F238E27FC236}">
+                <a16:creationId xmlns:a16="http://schemas.microsoft.com/office/drawing/2014/main" id="{DE15C358-1FA5-47CB-8D9A-92A7B5D33465}"/>
+              </a:ext>
+            </a:extLst>
+          </p:cNvPr>
+          <p:cNvSpPr txBox="1"/>
+          <p:nvPr/>
+        </p:nvSpPr>
+        <p:spPr>
+          <a:xfrm>
+            <a:off x="3060418" y="2928504"/>
+            <a:ext cx="8026682" cy="461665"/>
           </a:xfrm>
           <a:prstGeom prst="rect">
             <a:avLst/>
@@ -4279,10 +4416,10 @@
       </p:sp>
       <p:sp>
         <p:nvSpPr>
-          <p:cNvPr id="22" name="TextBox 21">
-            <a:extLst>
-              <a:ext uri="{FF2B5EF4-FFF2-40B4-BE49-F238E27FC236}">
-                <a16:creationId xmlns:a16="http://schemas.microsoft.com/office/drawing/2014/main" id="{B3921B81-C796-4BD8-A372-18E09CFFB595}"/>
+          <p:cNvPr id="27" name="TextBox 26">
+            <a:extLst>
+              <a:ext uri="{FF2B5EF4-FFF2-40B4-BE49-F238E27FC236}">
+                <a16:creationId xmlns:a16="http://schemas.microsoft.com/office/drawing/2014/main" id="{A7EE1B45-F6F4-4551-9329-2ABE79454968}"/>
               </a:ext>
             </a:extLst>
           </p:cNvPr>
@@ -4291,8 +4428,8 @@
         </p:nvSpPr>
         <p:spPr>
           <a:xfrm>
-            <a:off x="1521112" y="3717620"/>
-            <a:ext cx="655949" cy="369332"/>
+            <a:off x="1581578" y="4457338"/>
+            <a:ext cx="657552" cy="369332"/>
           </a:xfrm>
           <a:prstGeom prst="rect">
             <a:avLst/>
@@ -4307,7 +4444,7 @@
           <a:p>
             <a:r>
               <a:rPr lang="en-US" altLang="ko-KR" dirty="0"/>
-              <a:t>002</a:t>
+              <a:t>003</a:t>
             </a:r>
             <a:endParaRPr lang="ko-KR" altLang="en-US" dirty="0"/>
           </a:p>
@@ -4315,10 +4452,10 @@
       </p:sp>
       <p:sp>
         <p:nvSpPr>
-          <p:cNvPr id="23" name="TextBox 22">
-            <a:extLst>
-              <a:ext uri="{FF2B5EF4-FFF2-40B4-BE49-F238E27FC236}">
-                <a16:creationId xmlns:a16="http://schemas.microsoft.com/office/drawing/2014/main" id="{6598FF87-5FC5-41F1-A935-8518D0B49166}"/>
+          <p:cNvPr id="28" name="TextBox 27">
+            <a:extLst>
+              <a:ext uri="{FF2B5EF4-FFF2-40B4-BE49-F238E27FC236}">
+                <a16:creationId xmlns:a16="http://schemas.microsoft.com/office/drawing/2014/main" id="{1E5AC435-47EB-41A2-BFBA-F9E57DF09646}"/>
               </a:ext>
             </a:extLst>
           </p:cNvPr>
@@ -4327,7 +4464,7 @@
         </p:nvSpPr>
         <p:spPr>
           <a:xfrm>
-            <a:off x="2371717" y="3717620"/>
+            <a:off x="2432183" y="4457338"/>
             <a:ext cx="447558" cy="369332"/>
           </a:xfrm>
           <a:prstGeom prst="rect">
@@ -4351,10 +4488,10 @@
       </p:sp>
       <p:sp>
         <p:nvSpPr>
-          <p:cNvPr id="24" name="TextBox 23">
-            <a:extLst>
-              <a:ext uri="{FF2B5EF4-FFF2-40B4-BE49-F238E27FC236}">
-                <a16:creationId xmlns:a16="http://schemas.microsoft.com/office/drawing/2014/main" id="{DE15C358-1FA5-47CB-8D9A-92A7B5D33465}"/>
+          <p:cNvPr id="29" name="TextBox 28">
+            <a:extLst>
+              <a:ext uri="{FF2B5EF4-FFF2-40B4-BE49-F238E27FC236}">
+                <a16:creationId xmlns:a16="http://schemas.microsoft.com/office/drawing/2014/main" id="{260BC241-1D22-46C6-AC7E-C9769E22D4E4}"/>
               </a:ext>
             </a:extLst>
           </p:cNvPr>
@@ -4363,8 +4500,8 @@
         </p:nvSpPr>
         <p:spPr>
           <a:xfrm>
-            <a:off x="3060418" y="3671454"/>
-            <a:ext cx="8026682" cy="461665"/>
+            <a:off x="3120884" y="4411172"/>
+            <a:ext cx="8111892" cy="461665"/>
           </a:xfrm>
           <a:prstGeom prst="rect">
             <a:avLst/>
@@ -4410,12 +4547,55 @@
           </a:p>
         </p:txBody>
       </p:sp>
-      <p:sp>
-        <p:nvSpPr>
-          <p:cNvPr id="27" name="TextBox 26">
-            <a:extLst>
-              <a:ext uri="{FF2B5EF4-FFF2-40B4-BE49-F238E27FC236}">
-                <a16:creationId xmlns:a16="http://schemas.microsoft.com/office/drawing/2014/main" id="{A7EE1B45-F6F4-4551-9329-2ABE79454968}"/>
+      <p:cxnSp>
+        <p:nvCxnSpPr>
+          <p:cNvPr id="7" name="직선 연결선 6">
+            <a:extLst>
+              <a:ext uri="{FF2B5EF4-FFF2-40B4-BE49-F238E27FC236}">
+                <a16:creationId xmlns:a16="http://schemas.microsoft.com/office/drawing/2014/main" id="{E73E0E8A-64C8-E2CB-89F2-8DE5693A85F2}"/>
+              </a:ext>
+            </a:extLst>
+          </p:cNvPr>
+          <p:cNvCxnSpPr>
+            <a:cxnSpLocks/>
+          </p:cNvCxnSpPr>
+          <p:nvPr/>
+        </p:nvCxnSpPr>
+        <p:spPr>
+          <a:xfrm>
+            <a:off x="1510251" y="5374133"/>
+            <a:ext cx="10708640" cy="0"/>
+          </a:xfrm>
+          <a:prstGeom prst="line">
+            <a:avLst/>
+          </a:prstGeom>
+          <a:ln w="9525">
+            <a:solidFill>
+              <a:schemeClr val="accent3"/>
+            </a:solidFill>
+          </a:ln>
+        </p:spPr>
+        <p:style>
+          <a:lnRef idx="1">
+            <a:schemeClr val="accent1"/>
+          </a:lnRef>
+          <a:fillRef idx="0">
+            <a:schemeClr val="accent1"/>
+          </a:fillRef>
+          <a:effectRef idx="0">
+            <a:schemeClr val="accent1"/>
+          </a:effectRef>
+          <a:fontRef idx="minor">
+            <a:schemeClr val="tx1"/>
+          </a:fontRef>
+        </p:style>
+      </p:cxnSp>
+      <p:sp>
+        <p:nvSpPr>
+          <p:cNvPr id="10" name="TextBox 9">
+            <a:extLst>
+              <a:ext uri="{FF2B5EF4-FFF2-40B4-BE49-F238E27FC236}">
+                <a16:creationId xmlns:a16="http://schemas.microsoft.com/office/drawing/2014/main" id="{3B191D2C-5DC2-9934-DE3B-F57AF21FAA50}"/>
               </a:ext>
             </a:extLst>
           </p:cNvPr>
@@ -4424,8 +4604,8 @@
         </p:nvSpPr>
         <p:spPr>
           <a:xfrm>
-            <a:off x="1581578" y="5424408"/>
-            <a:ext cx="657552" cy="369332"/>
+            <a:off x="1581576" y="5873764"/>
+            <a:ext cx="535724" cy="369332"/>
           </a:xfrm>
           <a:prstGeom prst="rect">
             <a:avLst/>
@@ -4440,7 +4620,7 @@
           <a:p>
             <a:r>
               <a:rPr lang="en-US" altLang="ko-KR" dirty="0"/>
-              <a:t>003</a:t>
+              <a:t>004</a:t>
             </a:r>
             <a:endParaRPr lang="ko-KR" altLang="en-US" dirty="0"/>
           </a:p>
@@ -4448,10 +4628,10 @@
       </p:sp>
       <p:sp>
         <p:nvSpPr>
-          <p:cNvPr id="28" name="TextBox 27">
-            <a:extLst>
-              <a:ext uri="{FF2B5EF4-FFF2-40B4-BE49-F238E27FC236}">
-                <a16:creationId xmlns:a16="http://schemas.microsoft.com/office/drawing/2014/main" id="{1E5AC435-47EB-41A2-BFBA-F9E57DF09646}"/>
+          <p:cNvPr id="12" name="TextBox 11">
+            <a:extLst>
+              <a:ext uri="{FF2B5EF4-FFF2-40B4-BE49-F238E27FC236}">
+                <a16:creationId xmlns:a16="http://schemas.microsoft.com/office/drawing/2014/main" id="{6342DAE1-103B-07C5-E5FD-5472A0DA2B80}"/>
               </a:ext>
             </a:extLst>
           </p:cNvPr>
@@ -4460,7 +4640,7 @@
         </p:nvSpPr>
         <p:spPr>
           <a:xfrm>
-            <a:off x="2432183" y="5424408"/>
+            <a:off x="2432181" y="5873764"/>
             <a:ext cx="447558" cy="369332"/>
           </a:xfrm>
           <a:prstGeom prst="rect">
@@ -4484,10 +4664,10 @@
       </p:sp>
       <p:sp>
         <p:nvSpPr>
-          <p:cNvPr id="29" name="TextBox 28">
-            <a:extLst>
-              <a:ext uri="{FF2B5EF4-FFF2-40B4-BE49-F238E27FC236}">
-                <a16:creationId xmlns:a16="http://schemas.microsoft.com/office/drawing/2014/main" id="{260BC241-1D22-46C6-AC7E-C9769E22D4E4}"/>
+          <p:cNvPr id="13" name="TextBox 12">
+            <a:extLst>
+              <a:ext uri="{FF2B5EF4-FFF2-40B4-BE49-F238E27FC236}">
+                <a16:creationId xmlns:a16="http://schemas.microsoft.com/office/drawing/2014/main" id="{E9D8D840-934F-E030-9A2E-E6BCA981DFA4}"/>
               </a:ext>
             </a:extLst>
           </p:cNvPr>
@@ -4496,7 +4676,7 @@
         </p:nvSpPr>
         <p:spPr>
           <a:xfrm>
-            <a:off x="3120884" y="5378242"/>
+            <a:off x="3120882" y="5827598"/>
             <a:ext cx="5950232" cy="461665"/>
           </a:xfrm>
           <a:prstGeom prst="rect">
@@ -4559,6 +4739,561 @@
 </file>
 
 <file path=ppt/slides/slide11.xml><?xml version="1.0" encoding="utf-8"?>
+<p:sld xmlns:a="http://schemas.openxmlformats.org/drawingml/2006/main" xmlns:r="http://schemas.openxmlformats.org/officeDocument/2006/relationships" xmlns:p="http://schemas.openxmlformats.org/presentationml/2006/main">
+  <p:cSld>
+    <p:spTree>
+      <p:nvGrpSpPr>
+        <p:cNvPr id="1" name=""/>
+        <p:cNvGrpSpPr/>
+        <p:nvPr/>
+      </p:nvGrpSpPr>
+      <p:grpSpPr>
+        <a:xfrm>
+          <a:off x="0" y="0"/>
+          <a:ext cx="0" cy="0"/>
+          <a:chOff x="0" y="0"/>
+          <a:chExt cx="0" cy="0"/>
+        </a:xfrm>
+      </p:grpSpPr>
+      <p:sp>
+        <p:nvSpPr>
+          <p:cNvPr id="10" name="TextBox 9">
+            <a:extLst>
+              <a:ext uri="{FF2B5EF4-FFF2-40B4-BE49-F238E27FC236}">
+                <a16:creationId xmlns:a16="http://schemas.microsoft.com/office/drawing/2014/main" id="{17DB6AF0-B3F5-C37A-1ACC-F7D47B17CAA0}"/>
+              </a:ext>
+            </a:extLst>
+          </p:cNvPr>
+          <p:cNvSpPr txBox="1"/>
+          <p:nvPr/>
+        </p:nvSpPr>
+        <p:spPr>
+          <a:xfrm>
+            <a:off x="4561164" y="5892323"/>
+            <a:ext cx="2656496" cy="369332"/>
+          </a:xfrm>
+          <a:prstGeom prst="rect">
+            <a:avLst/>
+          </a:prstGeom>
+          <a:noFill/>
+        </p:spPr>
+        <p:txBody>
+          <a:bodyPr wrap="none" rtlCol="0">
+            <a:spAutoFit/>
+          </a:bodyPr>
+          <a:lstStyle/>
+          <a:p>
+            <a:r>
+              <a:rPr lang="ko-KR" altLang="en-US" dirty="0">
+                <a:solidFill>
+                  <a:schemeClr val="accent2"/>
+                </a:solidFill>
+              </a:rPr>
+              <a:t>로그인</a:t>
+            </a:r>
+            <a:r>
+              <a:rPr lang="en-US" altLang="ko-KR" dirty="0">
+                <a:solidFill>
+                  <a:schemeClr val="accent2"/>
+                </a:solidFill>
+              </a:rPr>
+              <a:t>, </a:t>
+            </a:r>
+            <a:r>
+              <a:rPr lang="ko-KR" altLang="en-US" dirty="0">
+                <a:solidFill>
+                  <a:schemeClr val="accent2"/>
+                </a:solidFill>
+              </a:rPr>
+              <a:t>회원가입 서비스</a:t>
+            </a:r>
+          </a:p>
+        </p:txBody>
+      </p:sp>
+      <p:pic>
+        <p:nvPicPr>
+          <p:cNvPr id="3" name="그림 2" descr="텍스트, 스크린샷, 폰트, 디자인이(가) 표시된 사진&#10;&#10;자동 생성된 설명">
+            <a:extLst>
+              <a:ext uri="{FF2B5EF4-FFF2-40B4-BE49-F238E27FC236}">
+                <a16:creationId xmlns:a16="http://schemas.microsoft.com/office/drawing/2014/main" id="{B9B2246D-422C-5B13-C692-2365D578459C}"/>
+              </a:ext>
+            </a:extLst>
+          </p:cNvPr>
+          <p:cNvPicPr>
+            <a:picLocks noChangeAspect="1"/>
+          </p:cNvPicPr>
+          <p:nvPr/>
+        </p:nvPicPr>
+        <p:blipFill>
+          <a:blip r:embed="rId2" cstate="screen">
+            <a:extLst>
+              <a:ext uri="{28A0092B-C50C-407E-A947-70E740481C1C}">
+                <a14:useLocalDpi xmlns:a14="http://schemas.microsoft.com/office/drawing/2010/main" val="0"/>
+              </a:ext>
+            </a:extLst>
+          </a:blip>
+          <a:stretch>
+            <a:fillRect/>
+          </a:stretch>
+        </p:blipFill>
+        <p:spPr>
+          <a:xfrm>
+            <a:off x="2883968" y="705923"/>
+            <a:ext cx="2824333" cy="4923351"/>
+          </a:xfrm>
+          <a:prstGeom prst="rect">
+            <a:avLst/>
+          </a:prstGeom>
+        </p:spPr>
+      </p:pic>
+      <p:pic>
+        <p:nvPicPr>
+          <p:cNvPr id="5" name="그림 4" descr="텍스트, 스크린샷, 디자인이(가) 표시된 사진&#10;&#10;자동 생성된 설명">
+            <a:extLst>
+              <a:ext uri="{FF2B5EF4-FFF2-40B4-BE49-F238E27FC236}">
+                <a16:creationId xmlns:a16="http://schemas.microsoft.com/office/drawing/2014/main" id="{FBCEF1DB-14B0-F502-154A-658842762E85}"/>
+              </a:ext>
+            </a:extLst>
+          </p:cNvPr>
+          <p:cNvPicPr>
+            <a:picLocks noChangeAspect="1"/>
+          </p:cNvPicPr>
+          <p:nvPr/>
+        </p:nvPicPr>
+        <p:blipFill>
+          <a:blip r:embed="rId3" cstate="screen">
+            <a:extLst>
+              <a:ext uri="{28A0092B-C50C-407E-A947-70E740481C1C}">
+                <a14:useLocalDpi xmlns:a14="http://schemas.microsoft.com/office/drawing/2010/main" val="0"/>
+              </a:ext>
+            </a:extLst>
+          </a:blip>
+          <a:stretch>
+            <a:fillRect/>
+          </a:stretch>
+        </p:blipFill>
+        <p:spPr>
+          <a:xfrm>
+            <a:off x="6133897" y="464204"/>
+            <a:ext cx="3431825" cy="5165070"/>
+          </a:xfrm>
+          <a:prstGeom prst="rect">
+            <a:avLst/>
+          </a:prstGeom>
+        </p:spPr>
+      </p:pic>
+    </p:spTree>
+    <p:extLst>
+      <p:ext uri="{BB962C8B-B14F-4D97-AF65-F5344CB8AC3E}">
+        <p14:creationId xmlns:p14="http://schemas.microsoft.com/office/powerpoint/2010/main" val="119488341"/>
+      </p:ext>
+    </p:extLst>
+  </p:cSld>
+  <p:clrMapOvr>
+    <a:masterClrMapping/>
+  </p:clrMapOvr>
+</p:sld>
+</file>
+
+<file path=ppt/slides/slide12.xml><?xml version="1.0" encoding="utf-8"?>
+<p:sld xmlns:a="http://schemas.openxmlformats.org/drawingml/2006/main" xmlns:r="http://schemas.openxmlformats.org/officeDocument/2006/relationships" xmlns:p="http://schemas.openxmlformats.org/presentationml/2006/main">
+  <p:cSld>
+    <p:spTree>
+      <p:nvGrpSpPr>
+        <p:cNvPr id="1" name=""/>
+        <p:cNvGrpSpPr/>
+        <p:nvPr/>
+      </p:nvGrpSpPr>
+      <p:grpSpPr>
+        <a:xfrm>
+          <a:off x="0" y="0"/>
+          <a:ext cx="0" cy="0"/>
+          <a:chOff x="0" y="0"/>
+          <a:chExt cx="0" cy="0"/>
+        </a:xfrm>
+      </p:grpSpPr>
+      <p:sp>
+        <p:nvSpPr>
+          <p:cNvPr id="10" name="TextBox 9">
+            <a:extLst>
+              <a:ext uri="{FF2B5EF4-FFF2-40B4-BE49-F238E27FC236}">
+                <a16:creationId xmlns:a16="http://schemas.microsoft.com/office/drawing/2014/main" id="{17DB6AF0-B3F5-C37A-1ACC-F7D47B17CAA0}"/>
+              </a:ext>
+            </a:extLst>
+          </p:cNvPr>
+          <p:cNvSpPr txBox="1"/>
+          <p:nvPr/>
+        </p:nvSpPr>
+        <p:spPr>
+          <a:xfrm>
+            <a:off x="5019477" y="6073298"/>
+            <a:ext cx="1959191" cy="369332"/>
+          </a:xfrm>
+          <a:prstGeom prst="rect">
+            <a:avLst/>
+          </a:prstGeom>
+          <a:noFill/>
+        </p:spPr>
+        <p:txBody>
+          <a:bodyPr wrap="none" rtlCol="0">
+            <a:spAutoFit/>
+          </a:bodyPr>
+          <a:lstStyle/>
+          <a:p>
+            <a:r>
+              <a:rPr lang="ko-KR" altLang="en-US" dirty="0">
+                <a:solidFill>
+                  <a:schemeClr val="accent2"/>
+                </a:solidFill>
+              </a:rPr>
+              <a:t>시간 예약 서비스</a:t>
+            </a:r>
+            <a:r>
+              <a:rPr lang="en-US" altLang="ko-KR" dirty="0">
+                <a:solidFill>
+                  <a:schemeClr val="accent2"/>
+                </a:solidFill>
+              </a:rPr>
+              <a:t> </a:t>
+            </a:r>
+            <a:endParaRPr lang="ko-KR" altLang="en-US" dirty="0">
+              <a:solidFill>
+                <a:schemeClr val="accent2"/>
+              </a:solidFill>
+            </a:endParaRPr>
+          </a:p>
+        </p:txBody>
+      </p:sp>
+      <p:pic>
+        <p:nvPicPr>
+          <p:cNvPr id="3" name="그림 2" descr="텍스트, 스크린샷, 소프트웨어, 번호이(가) 표시된 사진&#10;&#10;자동 생성된 설명">
+            <a:extLst>
+              <a:ext uri="{FF2B5EF4-FFF2-40B4-BE49-F238E27FC236}">
+                <a16:creationId xmlns:a16="http://schemas.microsoft.com/office/drawing/2014/main" id="{B82F3138-6A36-1569-EF67-95E15F940483}"/>
+              </a:ext>
+            </a:extLst>
+          </p:cNvPr>
+          <p:cNvPicPr>
+            <a:picLocks noChangeAspect="1"/>
+          </p:cNvPicPr>
+          <p:nvPr/>
+        </p:nvPicPr>
+        <p:blipFill>
+          <a:blip r:embed="rId2" cstate="screen">
+            <a:extLst>
+              <a:ext uri="{28A0092B-C50C-407E-A947-70E740481C1C}">
+                <a14:useLocalDpi xmlns:a14="http://schemas.microsoft.com/office/drawing/2010/main" val="0"/>
+              </a:ext>
+            </a:extLst>
+          </a:blip>
+          <a:stretch>
+            <a:fillRect/>
+          </a:stretch>
+        </p:blipFill>
+        <p:spPr>
+          <a:xfrm>
+            <a:off x="1704975" y="485223"/>
+            <a:ext cx="8588196" cy="5315502"/>
+          </a:xfrm>
+          <a:prstGeom prst="rect">
+            <a:avLst/>
+          </a:prstGeom>
+        </p:spPr>
+      </p:pic>
+      <p:pic>
+        <p:nvPicPr>
+          <p:cNvPr id="5" name="그림 4" descr="텍스트, 폰트, 스크린샷, 그린이(가) 표시된 사진&#10;&#10;자동 생성된 설명">
+            <a:extLst>
+              <a:ext uri="{FF2B5EF4-FFF2-40B4-BE49-F238E27FC236}">
+                <a16:creationId xmlns:a16="http://schemas.microsoft.com/office/drawing/2014/main" id="{3E068754-34C9-4A0E-203F-AA0F78D1C059}"/>
+              </a:ext>
+            </a:extLst>
+          </p:cNvPr>
+          <p:cNvPicPr>
+            <a:picLocks noChangeAspect="1"/>
+          </p:cNvPicPr>
+          <p:nvPr/>
+        </p:nvPicPr>
+        <p:blipFill>
+          <a:blip r:embed="rId3" cstate="screen">
+            <a:extLst>
+              <a:ext uri="{28A0092B-C50C-407E-A947-70E740481C1C}">
+                <a14:useLocalDpi xmlns:a14="http://schemas.microsoft.com/office/drawing/2010/main" val="0"/>
+              </a:ext>
+            </a:extLst>
+          </a:blip>
+          <a:stretch>
+            <a:fillRect/>
+          </a:stretch>
+        </p:blipFill>
+        <p:spPr>
+          <a:xfrm>
+            <a:off x="1704975" y="4737570"/>
+            <a:ext cx="3588148" cy="1063155"/>
+          </a:xfrm>
+          <a:prstGeom prst="rect">
+            <a:avLst/>
+          </a:prstGeom>
+        </p:spPr>
+      </p:pic>
+    </p:spTree>
+    <p:extLst>
+      <p:ext uri="{BB962C8B-B14F-4D97-AF65-F5344CB8AC3E}">
+        <p14:creationId xmlns:p14="http://schemas.microsoft.com/office/powerpoint/2010/main" val="26296733"/>
+      </p:ext>
+    </p:extLst>
+  </p:cSld>
+  <p:clrMapOvr>
+    <a:masterClrMapping/>
+  </p:clrMapOvr>
+</p:sld>
+</file>
+
+<file path=ppt/slides/slide13.xml><?xml version="1.0" encoding="utf-8"?>
+<p:sld xmlns:a="http://schemas.openxmlformats.org/drawingml/2006/main" xmlns:r="http://schemas.openxmlformats.org/officeDocument/2006/relationships" xmlns:p="http://schemas.openxmlformats.org/presentationml/2006/main">
+  <p:cSld>
+    <p:spTree>
+      <p:nvGrpSpPr>
+        <p:cNvPr id="1" name=""/>
+        <p:cNvGrpSpPr/>
+        <p:nvPr/>
+      </p:nvGrpSpPr>
+      <p:grpSpPr>
+        <a:xfrm>
+          <a:off x="0" y="0"/>
+          <a:ext cx="0" cy="0"/>
+          <a:chOff x="0" y="0"/>
+          <a:chExt cx="0" cy="0"/>
+        </a:xfrm>
+      </p:grpSpPr>
+      <p:sp>
+        <p:nvSpPr>
+          <p:cNvPr id="10" name="TextBox 9">
+            <a:extLst>
+              <a:ext uri="{FF2B5EF4-FFF2-40B4-BE49-F238E27FC236}">
+                <a16:creationId xmlns:a16="http://schemas.microsoft.com/office/drawing/2014/main" id="{17DB6AF0-B3F5-C37A-1ACC-F7D47B17CAA0}"/>
+              </a:ext>
+            </a:extLst>
+          </p:cNvPr>
+          <p:cNvSpPr txBox="1"/>
+          <p:nvPr/>
+        </p:nvSpPr>
+        <p:spPr>
+          <a:xfrm>
+            <a:off x="3245700" y="6071324"/>
+            <a:ext cx="5700600" cy="369332"/>
+          </a:xfrm>
+          <a:prstGeom prst="rect">
+            <a:avLst/>
+          </a:prstGeom>
+          <a:noFill/>
+        </p:spPr>
+        <p:txBody>
+          <a:bodyPr wrap="none" rtlCol="0">
+            <a:spAutoFit/>
+          </a:bodyPr>
+          <a:lstStyle/>
+          <a:p>
+            <a:r>
+              <a:rPr lang="ko-KR" altLang="en-US" sz="1800" spc="-150" dirty="0">
+                <a:solidFill>
+                  <a:schemeClr val="accent2"/>
+                </a:solidFill>
+                <a:latin typeface="+mj-ea"/>
+                <a:ea typeface="+mj-ea"/>
+              </a:rPr>
+              <a:t>위치기반 서비스를 이용한 주변 </a:t>
+            </a:r>
+            <a:r>
+              <a:rPr lang="ko-KR" altLang="en-US" sz="1800" spc="-150" dirty="0" err="1">
+                <a:solidFill>
+                  <a:schemeClr val="accent2"/>
+                </a:solidFill>
+                <a:latin typeface="+mj-ea"/>
+                <a:ea typeface="+mj-ea"/>
+              </a:rPr>
+              <a:t>원데이</a:t>
+            </a:r>
+            <a:r>
+              <a:rPr lang="ko-KR" altLang="en-US" sz="1800" spc="-150" dirty="0">
+                <a:solidFill>
+                  <a:schemeClr val="accent2"/>
+                </a:solidFill>
+                <a:latin typeface="+mj-ea"/>
+                <a:ea typeface="+mj-ea"/>
+              </a:rPr>
+              <a:t> 클래스 탐색 서비스</a:t>
+            </a:r>
+          </a:p>
+        </p:txBody>
+      </p:sp>
+      <p:pic>
+        <p:nvPicPr>
+          <p:cNvPr id="3" name="그림 2" descr="지도, 텍스트, 아틀라스, 평면도이(가) 표시된 사진&#10;&#10;자동 생성된 설명">
+            <a:extLst>
+              <a:ext uri="{FF2B5EF4-FFF2-40B4-BE49-F238E27FC236}">
+                <a16:creationId xmlns:a16="http://schemas.microsoft.com/office/drawing/2014/main" id="{A731D2CC-6FAC-0547-65E6-6C61F3B91FAE}"/>
+              </a:ext>
+            </a:extLst>
+          </p:cNvPr>
+          <p:cNvPicPr>
+            <a:picLocks noChangeAspect="1"/>
+          </p:cNvPicPr>
+          <p:nvPr/>
+        </p:nvPicPr>
+        <p:blipFill>
+          <a:blip r:embed="rId2" cstate="screen">
+            <a:extLst>
+              <a:ext uri="{28A0092B-C50C-407E-A947-70E740481C1C}">
+                <a14:useLocalDpi xmlns:a14="http://schemas.microsoft.com/office/drawing/2010/main" val="0"/>
+              </a:ext>
+            </a:extLst>
+          </a:blip>
+          <a:stretch>
+            <a:fillRect/>
+          </a:stretch>
+        </p:blipFill>
+        <p:spPr>
+          <a:xfrm>
+            <a:off x="1789267" y="602010"/>
+            <a:ext cx="8613466" cy="5371285"/>
+          </a:xfrm>
+          <a:prstGeom prst="rect">
+            <a:avLst/>
+          </a:prstGeom>
+        </p:spPr>
+      </p:pic>
+    </p:spTree>
+    <p:extLst>
+      <p:ext uri="{BB962C8B-B14F-4D97-AF65-F5344CB8AC3E}">
+        <p14:creationId xmlns:p14="http://schemas.microsoft.com/office/powerpoint/2010/main" val="3931692184"/>
+      </p:ext>
+    </p:extLst>
+  </p:cSld>
+  <p:clrMapOvr>
+    <a:masterClrMapping/>
+  </p:clrMapOvr>
+</p:sld>
+</file>
+
+<file path=ppt/slides/slide14.xml><?xml version="1.0" encoding="utf-8"?>
+<p:sld xmlns:a="http://schemas.openxmlformats.org/drawingml/2006/main" xmlns:r="http://schemas.openxmlformats.org/officeDocument/2006/relationships" xmlns:p="http://schemas.openxmlformats.org/presentationml/2006/main">
+  <p:cSld>
+    <p:spTree>
+      <p:nvGrpSpPr>
+        <p:cNvPr id="1" name=""/>
+        <p:cNvGrpSpPr/>
+        <p:nvPr/>
+      </p:nvGrpSpPr>
+      <p:grpSpPr>
+        <a:xfrm>
+          <a:off x="0" y="0"/>
+          <a:ext cx="0" cy="0"/>
+          <a:chOff x="0" y="0"/>
+          <a:chExt cx="0" cy="0"/>
+        </a:xfrm>
+      </p:grpSpPr>
+      <p:sp>
+        <p:nvSpPr>
+          <p:cNvPr id="10" name="TextBox 9">
+            <a:extLst>
+              <a:ext uri="{FF2B5EF4-FFF2-40B4-BE49-F238E27FC236}">
+                <a16:creationId xmlns:a16="http://schemas.microsoft.com/office/drawing/2014/main" id="{17DB6AF0-B3F5-C37A-1ACC-F7D47B17CAA0}"/>
+              </a:ext>
+            </a:extLst>
+          </p:cNvPr>
+          <p:cNvSpPr txBox="1"/>
+          <p:nvPr/>
+        </p:nvSpPr>
+        <p:spPr>
+          <a:xfrm>
+            <a:off x="3880488" y="6130409"/>
+            <a:ext cx="4431021" cy="369332"/>
+          </a:xfrm>
+          <a:prstGeom prst="rect">
+            <a:avLst/>
+          </a:prstGeom>
+          <a:noFill/>
+        </p:spPr>
+        <p:txBody>
+          <a:bodyPr wrap="none" rtlCol="0">
+            <a:spAutoFit/>
+          </a:bodyPr>
+          <a:lstStyle/>
+          <a:p>
+            <a:r>
+              <a:rPr lang="ko-KR" altLang="en-US" sz="1800" spc="-150" dirty="0" err="1">
+                <a:solidFill>
+                  <a:schemeClr val="accent2"/>
+                </a:solidFill>
+                <a:latin typeface="+mj-ea"/>
+                <a:ea typeface="+mj-ea"/>
+              </a:rPr>
+              <a:t>원데이</a:t>
+            </a:r>
+            <a:r>
+              <a:rPr lang="ko-KR" altLang="en-US" sz="1800" spc="-150" dirty="0">
+                <a:solidFill>
+                  <a:schemeClr val="accent2"/>
+                </a:solidFill>
+                <a:latin typeface="+mj-ea"/>
+                <a:ea typeface="+mj-ea"/>
+              </a:rPr>
+              <a:t> 클래스 이용 후의 리뷰 및 평점 서비스</a:t>
+            </a:r>
+          </a:p>
+        </p:txBody>
+      </p:sp>
+      <p:pic>
+        <p:nvPicPr>
+          <p:cNvPr id="3" name="그림 2" descr="텍스트, 스크린샷, 폰트, 번호이(가) 표시된 사진&#10;&#10;자동 생성된 설명">
+            <a:extLst>
+              <a:ext uri="{FF2B5EF4-FFF2-40B4-BE49-F238E27FC236}">
+                <a16:creationId xmlns:a16="http://schemas.microsoft.com/office/drawing/2014/main" id="{6C101128-42FA-EDFA-192B-8CFD8A9DE6CB}"/>
+              </a:ext>
+            </a:extLst>
+          </p:cNvPr>
+          <p:cNvPicPr>
+            <a:picLocks noChangeAspect="1"/>
+          </p:cNvPicPr>
+          <p:nvPr/>
+        </p:nvPicPr>
+        <p:blipFill>
+          <a:blip r:embed="rId2" cstate="screen">
+            <a:extLst>
+              <a:ext uri="{28A0092B-C50C-407E-A947-70E740481C1C}">
+                <a14:useLocalDpi xmlns:a14="http://schemas.microsoft.com/office/drawing/2010/main" val="0"/>
+              </a:ext>
+            </a:extLst>
+          </a:blip>
+          <a:stretch>
+            <a:fillRect/>
+          </a:stretch>
+        </p:blipFill>
+        <p:spPr>
+          <a:xfrm>
+            <a:off x="2058915" y="542925"/>
+            <a:ext cx="8074169" cy="5095875"/>
+          </a:xfrm>
+          <a:prstGeom prst="rect">
+            <a:avLst/>
+          </a:prstGeom>
+        </p:spPr>
+      </p:pic>
+    </p:spTree>
+    <p:extLst>
+      <p:ext uri="{BB962C8B-B14F-4D97-AF65-F5344CB8AC3E}">
+        <p14:creationId xmlns:p14="http://schemas.microsoft.com/office/powerpoint/2010/main" val="688530845"/>
+      </p:ext>
+    </p:extLst>
+  </p:cSld>
+  <p:clrMapOvr>
+    <a:masterClrMapping/>
+  </p:clrMapOvr>
+</p:sld>
+</file>
+
+<file path=ppt/slides/slide15.xml><?xml version="1.0" encoding="utf-8"?>
 <p:sld xmlns:a="http://schemas.openxmlformats.org/drawingml/2006/main" xmlns:r="http://schemas.openxmlformats.org/officeDocument/2006/relationships" xmlns:p="http://schemas.openxmlformats.org/presentationml/2006/main">
   <p:cSld>
     <p:spTree>
@@ -4794,7 +5529,7 @@
 </p:sld>
 </file>
 
-<file path=ppt/slides/slide12.xml><?xml version="1.0" encoding="utf-8"?>
+<file path=ppt/slides/slide16.xml><?xml version="1.0" encoding="utf-8"?>
 <p:sld xmlns:a="http://schemas.openxmlformats.org/drawingml/2006/main" xmlns:r="http://schemas.openxmlformats.org/officeDocument/2006/relationships" xmlns:p="http://schemas.openxmlformats.org/presentationml/2006/main">
   <p:cSld>
     <p:bg>
@@ -5291,7 +6026,7 @@
 </p:sld>
 </file>
 
-<file path=ppt/slides/slide13.xml><?xml version="1.0" encoding="utf-8"?>
+<file path=ppt/slides/slide17.xml><?xml version="1.0" encoding="utf-8"?>
 <p:sld xmlns:a="http://schemas.openxmlformats.org/drawingml/2006/main" xmlns:r="http://schemas.openxmlformats.org/officeDocument/2006/relationships" xmlns:p="http://schemas.openxmlformats.org/presentationml/2006/main">
   <p:cSld>
     <p:bg>
@@ -7470,6 +8205,2216 @@
           </a:p>
         </p:txBody>
       </p:sp>
+      <p:graphicFrame>
+        <p:nvGraphicFramePr>
+          <p:cNvPr id="7" name="표 6">
+            <a:extLst>
+              <a:ext uri="{FF2B5EF4-FFF2-40B4-BE49-F238E27FC236}">
+                <a16:creationId xmlns:a16="http://schemas.microsoft.com/office/drawing/2014/main" id="{90387342-3981-56CE-BEAF-ACA02A91FD48}"/>
+              </a:ext>
+            </a:extLst>
+          </p:cNvPr>
+          <p:cNvGraphicFramePr>
+            <a:graphicFrameLocks noGrp="1"/>
+          </p:cNvGraphicFramePr>
+          <p:nvPr>
+            <p:extLst>
+              <p:ext uri="{D42A27DB-BD31-4B8C-83A1-F6EECF244321}">
+                <p14:modId xmlns:p14="http://schemas.microsoft.com/office/powerpoint/2010/main" val="2407536228"/>
+              </p:ext>
+            </p:extLst>
+          </p:nvPr>
+        </p:nvGraphicFramePr>
+        <p:xfrm>
+          <a:off x="696000" y="1519885"/>
+          <a:ext cx="10800000" cy="4315853"/>
+        </p:xfrm>
+        <a:graphic>
+          <a:graphicData uri="http://schemas.openxmlformats.org/drawingml/2006/table">
+            <a:tbl>
+              <a:tblPr firstRow="1" bandRow="1">
+                <a:tableStyleId>{2D5ABB26-0587-4C30-8999-92F81FD0307C}</a:tableStyleId>
+              </a:tblPr>
+              <a:tblGrid>
+                <a:gridCol w="2700000">
+                  <a:extLst>
+                    <a:ext uri="{9D8B030D-6E8A-4147-A177-3AD203B41FA5}">
+                      <a16:colId xmlns:a16="http://schemas.microsoft.com/office/drawing/2014/main" val="20000"/>
+                    </a:ext>
+                  </a:extLst>
+                </a:gridCol>
+                <a:gridCol w="2700000">
+                  <a:extLst>
+                    <a:ext uri="{9D8B030D-6E8A-4147-A177-3AD203B41FA5}">
+                      <a16:colId xmlns:a16="http://schemas.microsoft.com/office/drawing/2014/main" val="20001"/>
+                    </a:ext>
+                  </a:extLst>
+                </a:gridCol>
+                <a:gridCol w="2700000">
+                  <a:extLst>
+                    <a:ext uri="{9D8B030D-6E8A-4147-A177-3AD203B41FA5}">
+                      <a16:colId xmlns:a16="http://schemas.microsoft.com/office/drawing/2014/main" val="20002"/>
+                    </a:ext>
+                  </a:extLst>
+                </a:gridCol>
+                <a:gridCol w="2700000">
+                  <a:extLst>
+                    <a:ext uri="{9D8B030D-6E8A-4147-A177-3AD203B41FA5}">
+                      <a16:colId xmlns:a16="http://schemas.microsoft.com/office/drawing/2014/main" val="20003"/>
+                    </a:ext>
+                  </a:extLst>
+                </a:gridCol>
+              </a:tblGrid>
+              <a:tr h="714864">
+                <a:tc>
+                  <a:txBody>
+                    <a:bodyPr/>
+                    <a:lstStyle/>
+                    <a:p>
+                      <a:pPr algn="ctr" latinLnBrk="1"/>
+                      <a:r>
+                        <a:rPr lang="ko-KR" altLang="en-US" sz="2100" b="1" dirty="0">
+                          <a:solidFill>
+                            <a:schemeClr val="bg2">
+                              <a:lumMod val="25000"/>
+                            </a:schemeClr>
+                          </a:solidFill>
+                          <a:latin typeface="Arial" panose="020B0604020202020204" pitchFamily="34" charset="0"/>
+                          <a:cs typeface="Arial" panose="020B0604020202020204" pitchFamily="34" charset="0"/>
+                        </a:rPr>
+                        <a:t>구분</a:t>
+                      </a:r>
+                    </a:p>
+                  </a:txBody>
+                  <a:tcPr marL="97914" marR="97914" marT="48957" marB="48957" anchor="ctr">
+                    <a:lnL>
+                      <a:noFill/>
+                    </a:lnL>
+                    <a:lnR w="6350" cap="flat" cmpd="sng" algn="ctr">
+                      <a:solidFill>
+                        <a:schemeClr val="bg1">
+                          <a:lumMod val="65000"/>
+                        </a:schemeClr>
+                      </a:solidFill>
+                      <a:prstDash val="solid"/>
+                      <a:round/>
+                      <a:headEnd type="none" w="med" len="med"/>
+                      <a:tailEnd type="none" w="med" len="med"/>
+                    </a:lnR>
+                    <a:lnT>
+                      <a:noFill/>
+                    </a:lnT>
+                    <a:lnB w="6350" cap="flat" cmpd="sng" algn="ctr">
+                      <a:solidFill>
+                        <a:schemeClr val="bg1">
+                          <a:lumMod val="65000"/>
+                        </a:schemeClr>
+                      </a:solidFill>
+                      <a:prstDash val="solid"/>
+                      <a:round/>
+                      <a:headEnd type="none" w="med" len="med"/>
+                      <a:tailEnd type="none" w="med" len="med"/>
+                    </a:lnB>
+                    <a:lnTlToBr w="12700" cmpd="sng">
+                      <a:noFill/>
+                      <a:prstDash val="solid"/>
+                    </a:lnTlToBr>
+                    <a:lnBlToTr w="12700" cmpd="sng">
+                      <a:noFill/>
+                      <a:prstDash val="solid"/>
+                    </a:lnBlToTr>
+                    <a:solidFill>
+                      <a:schemeClr val="accent4">
+                        <a:alpha val="80000"/>
+                      </a:schemeClr>
+                    </a:solidFill>
+                  </a:tcPr>
+                </a:tc>
+                <a:tc>
+                  <a:txBody>
+                    <a:bodyPr/>
+                    <a:lstStyle/>
+                    <a:p>
+                      <a:pPr algn="ctr" latinLnBrk="1"/>
+                      <a:r>
+                        <a:rPr lang="ko-KR" altLang="en-US" sz="2100" b="1" dirty="0">
+                          <a:solidFill>
+                            <a:schemeClr val="bg2">
+                              <a:lumMod val="25000"/>
+                            </a:schemeClr>
+                          </a:solidFill>
+                          <a:latin typeface="Arial" panose="020B0604020202020204" pitchFamily="34" charset="0"/>
+                          <a:cs typeface="Arial" panose="020B0604020202020204" pitchFamily="34" charset="0"/>
+                        </a:rPr>
+                        <a:t>예산액</a:t>
+                      </a:r>
+                    </a:p>
+                  </a:txBody>
+                  <a:tcPr marL="97914" marR="97914" marT="48957" marB="48957" anchor="ctr">
+                    <a:lnL w="6350" cap="flat" cmpd="sng" algn="ctr">
+                      <a:solidFill>
+                        <a:schemeClr val="bg1">
+                          <a:lumMod val="65000"/>
+                        </a:schemeClr>
+                      </a:solidFill>
+                      <a:prstDash val="solid"/>
+                      <a:round/>
+                      <a:headEnd type="none" w="med" len="med"/>
+                      <a:tailEnd type="none" w="med" len="med"/>
+                    </a:lnL>
+                    <a:lnR w="6350" cap="flat" cmpd="sng" algn="ctr">
+                      <a:solidFill>
+                        <a:schemeClr val="bg1">
+                          <a:lumMod val="65000"/>
+                        </a:schemeClr>
+                      </a:solidFill>
+                      <a:prstDash val="solid"/>
+                      <a:round/>
+                      <a:headEnd type="none" w="med" len="med"/>
+                      <a:tailEnd type="none" w="med" len="med"/>
+                    </a:lnR>
+                    <a:lnT>
+                      <a:noFill/>
+                    </a:lnT>
+                    <a:lnB w="6350" cap="flat" cmpd="sng" algn="ctr">
+                      <a:solidFill>
+                        <a:schemeClr val="bg1">
+                          <a:lumMod val="65000"/>
+                        </a:schemeClr>
+                      </a:solidFill>
+                      <a:prstDash val="solid"/>
+                      <a:round/>
+                      <a:headEnd type="none" w="med" len="med"/>
+                      <a:tailEnd type="none" w="med" len="med"/>
+                    </a:lnB>
+                    <a:lnTlToBr w="12700" cmpd="sng">
+                      <a:noFill/>
+                      <a:prstDash val="solid"/>
+                    </a:lnTlToBr>
+                    <a:lnBlToTr w="12700" cmpd="sng">
+                      <a:noFill/>
+                      <a:prstDash val="solid"/>
+                    </a:lnBlToTr>
+                    <a:solidFill>
+                      <a:schemeClr val="accent4">
+                        <a:alpha val="80000"/>
+                      </a:schemeClr>
+                    </a:solidFill>
+                  </a:tcPr>
+                </a:tc>
+                <a:tc>
+                  <a:txBody>
+                    <a:bodyPr/>
+                    <a:lstStyle/>
+                    <a:p>
+                      <a:pPr algn="ctr" latinLnBrk="1"/>
+                      <a:r>
+                        <a:rPr lang="ko-KR" altLang="en-US" sz="2100" b="1" dirty="0">
+                          <a:solidFill>
+                            <a:schemeClr val="bg2">
+                              <a:lumMod val="25000"/>
+                            </a:schemeClr>
+                          </a:solidFill>
+                          <a:latin typeface="Arial" panose="020B0604020202020204" pitchFamily="34" charset="0"/>
+                          <a:cs typeface="Arial" panose="020B0604020202020204" pitchFamily="34" charset="0"/>
+                        </a:rPr>
+                        <a:t>전년도 예산액</a:t>
+                      </a:r>
+                    </a:p>
+                  </a:txBody>
+                  <a:tcPr marL="97914" marR="97914" marT="48957" marB="48957" anchor="ctr">
+                    <a:lnL w="6350" cap="flat" cmpd="sng" algn="ctr">
+                      <a:solidFill>
+                        <a:schemeClr val="bg1">
+                          <a:lumMod val="65000"/>
+                        </a:schemeClr>
+                      </a:solidFill>
+                      <a:prstDash val="solid"/>
+                      <a:round/>
+                      <a:headEnd type="none" w="med" len="med"/>
+                      <a:tailEnd type="none" w="med" len="med"/>
+                    </a:lnL>
+                    <a:lnR w="6350" cap="flat" cmpd="sng" algn="ctr">
+                      <a:solidFill>
+                        <a:schemeClr val="bg1">
+                          <a:lumMod val="65000"/>
+                        </a:schemeClr>
+                      </a:solidFill>
+                      <a:prstDash val="solid"/>
+                      <a:round/>
+                      <a:headEnd type="none" w="med" len="med"/>
+                      <a:tailEnd type="none" w="med" len="med"/>
+                    </a:lnR>
+                    <a:lnT>
+                      <a:noFill/>
+                    </a:lnT>
+                    <a:lnB w="6350" cap="flat" cmpd="sng" algn="ctr">
+                      <a:solidFill>
+                        <a:schemeClr val="bg1">
+                          <a:lumMod val="65000"/>
+                        </a:schemeClr>
+                      </a:solidFill>
+                      <a:prstDash val="solid"/>
+                      <a:round/>
+                      <a:headEnd type="none" w="med" len="med"/>
+                      <a:tailEnd type="none" w="med" len="med"/>
+                    </a:lnB>
+                    <a:lnTlToBr w="12700" cmpd="sng">
+                      <a:noFill/>
+                      <a:prstDash val="solid"/>
+                    </a:lnTlToBr>
+                    <a:lnBlToTr w="12700" cmpd="sng">
+                      <a:noFill/>
+                      <a:prstDash val="solid"/>
+                    </a:lnBlToTr>
+                    <a:solidFill>
+                      <a:schemeClr val="accent4">
+                        <a:alpha val="80000"/>
+                      </a:schemeClr>
+                    </a:solidFill>
+                  </a:tcPr>
+                </a:tc>
+                <a:tc>
+                  <a:txBody>
+                    <a:bodyPr/>
+                    <a:lstStyle/>
+                    <a:p>
+                      <a:pPr algn="ctr" latinLnBrk="1"/>
+                      <a:r>
+                        <a:rPr lang="ko-KR" altLang="en-US" sz="2100" b="1" dirty="0">
+                          <a:solidFill>
+                            <a:schemeClr val="bg2">
+                              <a:lumMod val="25000"/>
+                            </a:schemeClr>
+                          </a:solidFill>
+                          <a:latin typeface="Arial" panose="020B0604020202020204" pitchFamily="34" charset="0"/>
+                          <a:cs typeface="Arial" panose="020B0604020202020204" pitchFamily="34" charset="0"/>
+                        </a:rPr>
+                        <a:t>증감률</a:t>
+                      </a:r>
+                    </a:p>
+                  </a:txBody>
+                  <a:tcPr marL="97914" marR="97914" marT="48957" marB="48957" anchor="ctr">
+                    <a:lnL w="6350" cap="flat" cmpd="sng" algn="ctr">
+                      <a:solidFill>
+                        <a:schemeClr val="bg1">
+                          <a:lumMod val="65000"/>
+                        </a:schemeClr>
+                      </a:solidFill>
+                      <a:prstDash val="solid"/>
+                      <a:round/>
+                      <a:headEnd type="none" w="med" len="med"/>
+                      <a:tailEnd type="none" w="med" len="med"/>
+                    </a:lnL>
+                    <a:lnR w="6350" cap="flat" cmpd="sng" algn="ctr">
+                      <a:noFill/>
+                      <a:prstDash val="solid"/>
+                      <a:round/>
+                      <a:headEnd type="none" w="med" len="med"/>
+                      <a:tailEnd type="none" w="med" len="med"/>
+                    </a:lnR>
+                    <a:lnT>
+                      <a:noFill/>
+                    </a:lnT>
+                    <a:lnB w="6350" cap="flat" cmpd="sng" algn="ctr">
+                      <a:solidFill>
+                        <a:schemeClr val="bg1">
+                          <a:lumMod val="65000"/>
+                        </a:schemeClr>
+                      </a:solidFill>
+                      <a:prstDash val="solid"/>
+                      <a:round/>
+                      <a:headEnd type="none" w="med" len="med"/>
+                      <a:tailEnd type="none" w="med" len="med"/>
+                    </a:lnB>
+                    <a:lnTlToBr w="12700" cmpd="sng">
+                      <a:noFill/>
+                      <a:prstDash val="solid"/>
+                    </a:lnTlToBr>
+                    <a:lnBlToTr w="12700" cmpd="sng">
+                      <a:noFill/>
+                      <a:prstDash val="solid"/>
+                    </a:lnBlToTr>
+                    <a:solidFill>
+                      <a:schemeClr val="accent4">
+                        <a:alpha val="80000"/>
+                      </a:schemeClr>
+                    </a:solidFill>
+                  </a:tcPr>
+                </a:tc>
+                <a:extLst>
+                  <a:ext uri="{0D108BD9-81ED-4DB2-BD59-A6C34878D82A}">
+                    <a16:rowId xmlns:a16="http://schemas.microsoft.com/office/drawing/2014/main" val="10000"/>
+                  </a:ext>
+                </a:extLst>
+              </a:tr>
+              <a:tr h="741533">
+                <a:tc>
+                  <a:txBody>
+                    <a:bodyPr/>
+                    <a:lstStyle/>
+                    <a:p>
+                      <a:pPr algn="ctr" latinLnBrk="1"/>
+                      <a:r>
+                        <a:rPr lang="ko-KR" altLang="en-US" sz="1900" dirty="0" err="1">
+                          <a:solidFill>
+                            <a:schemeClr val="bg2">
+                              <a:lumMod val="25000"/>
+                            </a:schemeClr>
+                          </a:solidFill>
+                          <a:latin typeface="Arial" panose="020B0604020202020204" pitchFamily="34" charset="0"/>
+                          <a:cs typeface="Arial" panose="020B0604020202020204" pitchFamily="34" charset="0"/>
+                        </a:rPr>
+                        <a:t>복지국</a:t>
+                      </a:r>
+                      <a:endParaRPr lang="ko-KR" altLang="en-US" sz="1900" dirty="0">
+                        <a:solidFill>
+                          <a:schemeClr val="bg2">
+                            <a:lumMod val="25000"/>
+                          </a:schemeClr>
+                        </a:solidFill>
+                        <a:latin typeface="Arial" panose="020B0604020202020204" pitchFamily="34" charset="0"/>
+                        <a:cs typeface="Arial" panose="020B0604020202020204" pitchFamily="34" charset="0"/>
+                      </a:endParaRPr>
+                    </a:p>
+                  </a:txBody>
+                  <a:tcPr marL="97914" marR="97914" marT="48957" marB="48957" anchor="ctr">
+                    <a:lnL>
+                      <a:noFill/>
+                    </a:lnL>
+                    <a:lnR w="6350" cap="flat" cmpd="sng" algn="ctr">
+                      <a:solidFill>
+                        <a:schemeClr val="bg1">
+                          <a:lumMod val="65000"/>
+                        </a:schemeClr>
+                      </a:solidFill>
+                      <a:prstDash val="solid"/>
+                      <a:round/>
+                      <a:headEnd type="none" w="med" len="med"/>
+                      <a:tailEnd type="none" w="med" len="med"/>
+                    </a:lnR>
+                    <a:lnT w="6350" cap="flat" cmpd="sng" algn="ctr">
+                      <a:solidFill>
+                        <a:schemeClr val="bg1">
+                          <a:lumMod val="65000"/>
+                        </a:schemeClr>
+                      </a:solidFill>
+                      <a:prstDash val="solid"/>
+                      <a:round/>
+                      <a:headEnd type="none" w="med" len="med"/>
+                      <a:tailEnd type="none" w="med" len="med"/>
+                    </a:lnT>
+                    <a:lnB w="6350" cap="flat" cmpd="sng" algn="ctr">
+                      <a:solidFill>
+                        <a:schemeClr val="bg1">
+                          <a:lumMod val="65000"/>
+                        </a:schemeClr>
+                      </a:solidFill>
+                      <a:prstDash val="solid"/>
+                      <a:round/>
+                      <a:headEnd type="none" w="med" len="med"/>
+                      <a:tailEnd type="none" w="med" len="med"/>
+                    </a:lnB>
+                    <a:lnTlToBr w="12700" cmpd="sng">
+                      <a:noFill/>
+                      <a:prstDash val="solid"/>
+                    </a:lnTlToBr>
+                    <a:lnBlToTr w="12700" cmpd="sng">
+                      <a:noFill/>
+                      <a:prstDash val="solid"/>
+                    </a:lnBlToTr>
+                    <a:solidFill>
+                      <a:schemeClr val="bg1">
+                        <a:lumMod val="75000"/>
+                      </a:schemeClr>
+                    </a:solidFill>
+                  </a:tcPr>
+                </a:tc>
+                <a:tc>
+                  <a:txBody>
+                    <a:bodyPr/>
+                    <a:lstStyle/>
+                    <a:p>
+                      <a:pPr marL="0" marR="0" indent="0" algn="ctr" defTabSz="914400" rtl="0" eaLnBrk="1" fontAlgn="auto" latinLnBrk="1" hangingPunct="1">
+                        <a:lnSpc>
+                          <a:spcPct val="100000"/>
+                        </a:lnSpc>
+                        <a:spcBef>
+                          <a:spcPts val="0"/>
+                        </a:spcBef>
+                        <a:spcAft>
+                          <a:spcPts val="0"/>
+                        </a:spcAft>
+                        <a:buClrTx/>
+                        <a:buSzTx/>
+                        <a:buFontTx/>
+                        <a:buNone/>
+                        <a:tabLst/>
+                        <a:defRPr/>
+                      </a:pPr>
+                      <a:r>
+                        <a:rPr lang="en-US" altLang="ko-KR" sz="1900" dirty="0">
+                          <a:solidFill>
+                            <a:schemeClr val="bg2">
+                              <a:lumMod val="25000"/>
+                            </a:schemeClr>
+                          </a:solidFill>
+                          <a:latin typeface="Arial" panose="020B0604020202020204" pitchFamily="34" charset="0"/>
+                          <a:cs typeface="Arial" panose="020B0604020202020204" pitchFamily="34" charset="0"/>
+                        </a:rPr>
+                        <a:t>2,390,209,231</a:t>
+                      </a:r>
+                      <a:endParaRPr lang="ko-KR" altLang="en-US" sz="1900" dirty="0">
+                        <a:solidFill>
+                          <a:schemeClr val="bg2">
+                            <a:lumMod val="25000"/>
+                          </a:schemeClr>
+                        </a:solidFill>
+                        <a:latin typeface="Arial" panose="020B0604020202020204" pitchFamily="34" charset="0"/>
+                        <a:cs typeface="Arial" panose="020B0604020202020204" pitchFamily="34" charset="0"/>
+                      </a:endParaRPr>
+                    </a:p>
+                  </a:txBody>
+                  <a:tcPr marL="97914" marR="97914" marT="48957" marB="48957" anchor="ctr">
+                    <a:lnL w="6350" cap="flat" cmpd="sng" algn="ctr">
+                      <a:solidFill>
+                        <a:schemeClr val="bg1">
+                          <a:lumMod val="65000"/>
+                        </a:schemeClr>
+                      </a:solidFill>
+                      <a:prstDash val="solid"/>
+                      <a:round/>
+                      <a:headEnd type="none" w="med" len="med"/>
+                      <a:tailEnd type="none" w="med" len="med"/>
+                    </a:lnL>
+                    <a:lnR w="6350" cap="flat" cmpd="sng" algn="ctr">
+                      <a:solidFill>
+                        <a:schemeClr val="bg1">
+                          <a:lumMod val="65000"/>
+                        </a:schemeClr>
+                      </a:solidFill>
+                      <a:prstDash val="solid"/>
+                      <a:round/>
+                      <a:headEnd type="none" w="med" len="med"/>
+                      <a:tailEnd type="none" w="med" len="med"/>
+                    </a:lnR>
+                    <a:lnT w="6350" cap="flat" cmpd="sng" algn="ctr">
+                      <a:solidFill>
+                        <a:schemeClr val="bg1">
+                          <a:lumMod val="65000"/>
+                        </a:schemeClr>
+                      </a:solidFill>
+                      <a:prstDash val="solid"/>
+                      <a:round/>
+                      <a:headEnd type="none" w="med" len="med"/>
+                      <a:tailEnd type="none" w="med" len="med"/>
+                    </a:lnT>
+                    <a:lnB w="6350" cap="flat" cmpd="sng" algn="ctr">
+                      <a:solidFill>
+                        <a:schemeClr val="bg1">
+                          <a:lumMod val="65000"/>
+                        </a:schemeClr>
+                      </a:solidFill>
+                      <a:prstDash val="solid"/>
+                      <a:round/>
+                      <a:headEnd type="none" w="med" len="med"/>
+                      <a:tailEnd type="none" w="med" len="med"/>
+                    </a:lnB>
+                    <a:lnTlToBr w="12700" cmpd="sng">
+                      <a:noFill/>
+                      <a:prstDash val="solid"/>
+                    </a:lnTlToBr>
+                    <a:lnBlToTr w="12700" cmpd="sng">
+                      <a:noFill/>
+                      <a:prstDash val="solid"/>
+                    </a:lnBlToTr>
+                    <a:solidFill>
+                      <a:schemeClr val="bg1">
+                        <a:lumMod val="75000"/>
+                      </a:schemeClr>
+                    </a:solidFill>
+                  </a:tcPr>
+                </a:tc>
+                <a:tc>
+                  <a:txBody>
+                    <a:bodyPr/>
+                    <a:lstStyle/>
+                    <a:p>
+                      <a:pPr marL="0" marR="0" indent="0" algn="ctr" defTabSz="914400" rtl="0" eaLnBrk="1" fontAlgn="auto" latinLnBrk="1" hangingPunct="1">
+                        <a:lnSpc>
+                          <a:spcPct val="100000"/>
+                        </a:lnSpc>
+                        <a:spcBef>
+                          <a:spcPts val="0"/>
+                        </a:spcBef>
+                        <a:spcAft>
+                          <a:spcPts val="0"/>
+                        </a:spcAft>
+                        <a:buClrTx/>
+                        <a:buSzTx/>
+                        <a:buFontTx/>
+                        <a:buNone/>
+                        <a:tabLst/>
+                        <a:defRPr/>
+                      </a:pPr>
+                      <a:r>
+                        <a:rPr lang="en-US" altLang="ko-KR" sz="1900" dirty="0">
+                          <a:solidFill>
+                            <a:schemeClr val="bg2">
+                              <a:lumMod val="25000"/>
+                            </a:schemeClr>
+                          </a:solidFill>
+                          <a:latin typeface="Arial" panose="020B0604020202020204" pitchFamily="34" charset="0"/>
+                          <a:cs typeface="Arial" panose="020B0604020202020204" pitchFamily="34" charset="0"/>
+                        </a:rPr>
+                        <a:t>2,156,643,614</a:t>
+                      </a:r>
+                      <a:endParaRPr lang="ko-KR" altLang="en-US" sz="1900" dirty="0">
+                        <a:solidFill>
+                          <a:schemeClr val="bg2">
+                            <a:lumMod val="25000"/>
+                          </a:schemeClr>
+                        </a:solidFill>
+                        <a:latin typeface="Arial" panose="020B0604020202020204" pitchFamily="34" charset="0"/>
+                        <a:cs typeface="Arial" panose="020B0604020202020204" pitchFamily="34" charset="0"/>
+                      </a:endParaRPr>
+                    </a:p>
+                  </a:txBody>
+                  <a:tcPr marL="97914" marR="97914" marT="48957" marB="48957" anchor="ctr">
+                    <a:lnL w="6350" cap="flat" cmpd="sng" algn="ctr">
+                      <a:solidFill>
+                        <a:schemeClr val="bg1">
+                          <a:lumMod val="65000"/>
+                        </a:schemeClr>
+                      </a:solidFill>
+                      <a:prstDash val="solid"/>
+                      <a:round/>
+                      <a:headEnd type="none" w="med" len="med"/>
+                      <a:tailEnd type="none" w="med" len="med"/>
+                    </a:lnL>
+                    <a:lnR w="6350" cap="flat" cmpd="sng" algn="ctr">
+                      <a:solidFill>
+                        <a:schemeClr val="bg1">
+                          <a:lumMod val="65000"/>
+                        </a:schemeClr>
+                      </a:solidFill>
+                      <a:prstDash val="solid"/>
+                      <a:round/>
+                      <a:headEnd type="none" w="med" len="med"/>
+                      <a:tailEnd type="none" w="med" len="med"/>
+                    </a:lnR>
+                    <a:lnT w="6350" cap="flat" cmpd="sng" algn="ctr">
+                      <a:solidFill>
+                        <a:schemeClr val="bg1">
+                          <a:lumMod val="65000"/>
+                        </a:schemeClr>
+                      </a:solidFill>
+                      <a:prstDash val="solid"/>
+                      <a:round/>
+                      <a:headEnd type="none" w="med" len="med"/>
+                      <a:tailEnd type="none" w="med" len="med"/>
+                    </a:lnT>
+                    <a:lnB w="6350" cap="flat" cmpd="sng" algn="ctr">
+                      <a:solidFill>
+                        <a:schemeClr val="bg1">
+                          <a:lumMod val="65000"/>
+                        </a:schemeClr>
+                      </a:solidFill>
+                      <a:prstDash val="solid"/>
+                      <a:round/>
+                      <a:headEnd type="none" w="med" len="med"/>
+                      <a:tailEnd type="none" w="med" len="med"/>
+                    </a:lnB>
+                    <a:lnTlToBr w="12700" cmpd="sng">
+                      <a:noFill/>
+                      <a:prstDash val="solid"/>
+                    </a:lnTlToBr>
+                    <a:lnBlToTr w="12700" cmpd="sng">
+                      <a:noFill/>
+                      <a:prstDash val="solid"/>
+                    </a:lnBlToTr>
+                    <a:solidFill>
+                      <a:schemeClr val="bg1">
+                        <a:lumMod val="75000"/>
+                      </a:schemeClr>
+                    </a:solidFill>
+                  </a:tcPr>
+                </a:tc>
+                <a:tc>
+                  <a:txBody>
+                    <a:bodyPr/>
+                    <a:lstStyle/>
+                    <a:p>
+                      <a:pPr marL="0" marR="0" indent="0" algn="ctr" defTabSz="914400" rtl="0" eaLnBrk="1" fontAlgn="auto" latinLnBrk="1" hangingPunct="1">
+                        <a:lnSpc>
+                          <a:spcPct val="100000"/>
+                        </a:lnSpc>
+                        <a:spcBef>
+                          <a:spcPts val="0"/>
+                        </a:spcBef>
+                        <a:spcAft>
+                          <a:spcPts val="0"/>
+                        </a:spcAft>
+                        <a:buClrTx/>
+                        <a:buSzTx/>
+                        <a:buFontTx/>
+                        <a:buNone/>
+                        <a:tabLst/>
+                        <a:defRPr/>
+                      </a:pPr>
+                      <a:r>
+                        <a:rPr lang="en-US" altLang="ko-KR" sz="1900" dirty="0">
+                          <a:solidFill>
+                            <a:schemeClr val="bg2">
+                              <a:lumMod val="25000"/>
+                            </a:schemeClr>
+                          </a:solidFill>
+                          <a:latin typeface="Arial" panose="020B0604020202020204" pitchFamily="34" charset="0"/>
+                          <a:cs typeface="Arial" panose="020B0604020202020204" pitchFamily="34" charset="0"/>
+                        </a:rPr>
+                        <a:t>10.83%</a:t>
+                      </a:r>
+                      <a:endParaRPr lang="ko-KR" altLang="en-US" sz="1900" dirty="0">
+                        <a:solidFill>
+                          <a:schemeClr val="bg2">
+                            <a:lumMod val="25000"/>
+                          </a:schemeClr>
+                        </a:solidFill>
+                        <a:latin typeface="Arial" panose="020B0604020202020204" pitchFamily="34" charset="0"/>
+                        <a:cs typeface="Arial" panose="020B0604020202020204" pitchFamily="34" charset="0"/>
+                      </a:endParaRPr>
+                    </a:p>
+                  </a:txBody>
+                  <a:tcPr marL="97914" marR="97914" marT="48957" marB="48957" anchor="ctr">
+                    <a:lnL w="6350" cap="flat" cmpd="sng" algn="ctr">
+                      <a:solidFill>
+                        <a:schemeClr val="bg1">
+                          <a:lumMod val="65000"/>
+                        </a:schemeClr>
+                      </a:solidFill>
+                      <a:prstDash val="solid"/>
+                      <a:round/>
+                      <a:headEnd type="none" w="med" len="med"/>
+                      <a:tailEnd type="none" w="med" len="med"/>
+                    </a:lnL>
+                    <a:lnR w="6350" cap="flat" cmpd="sng" algn="ctr">
+                      <a:noFill/>
+                      <a:prstDash val="solid"/>
+                      <a:round/>
+                      <a:headEnd type="none" w="med" len="med"/>
+                      <a:tailEnd type="none" w="med" len="med"/>
+                    </a:lnR>
+                    <a:lnT w="6350" cap="flat" cmpd="sng" algn="ctr">
+                      <a:solidFill>
+                        <a:schemeClr val="bg1">
+                          <a:lumMod val="65000"/>
+                        </a:schemeClr>
+                      </a:solidFill>
+                      <a:prstDash val="solid"/>
+                      <a:round/>
+                      <a:headEnd type="none" w="med" len="med"/>
+                      <a:tailEnd type="none" w="med" len="med"/>
+                    </a:lnT>
+                    <a:lnB w="6350" cap="flat" cmpd="sng" algn="ctr">
+                      <a:solidFill>
+                        <a:schemeClr val="bg1">
+                          <a:lumMod val="65000"/>
+                        </a:schemeClr>
+                      </a:solidFill>
+                      <a:prstDash val="solid"/>
+                      <a:round/>
+                      <a:headEnd type="none" w="med" len="med"/>
+                      <a:tailEnd type="none" w="med" len="med"/>
+                    </a:lnB>
+                    <a:lnTlToBr w="12700" cmpd="sng">
+                      <a:noFill/>
+                      <a:prstDash val="solid"/>
+                    </a:lnTlToBr>
+                    <a:lnBlToTr w="12700" cmpd="sng">
+                      <a:noFill/>
+                      <a:prstDash val="solid"/>
+                    </a:lnBlToTr>
+                    <a:solidFill>
+                      <a:schemeClr val="bg1">
+                        <a:lumMod val="75000"/>
+                      </a:schemeClr>
+                    </a:solidFill>
+                  </a:tcPr>
+                </a:tc>
+                <a:extLst>
+                  <a:ext uri="{0D108BD9-81ED-4DB2-BD59-A6C34878D82A}">
+                    <a16:rowId xmlns:a16="http://schemas.microsoft.com/office/drawing/2014/main" val="10001"/>
+                  </a:ext>
+                </a:extLst>
+              </a:tr>
+              <a:tr h="714864">
+                <a:tc>
+                  <a:txBody>
+                    <a:bodyPr/>
+                    <a:lstStyle/>
+                    <a:p>
+                      <a:pPr algn="ctr" latinLnBrk="1"/>
+                      <a:r>
+                        <a:rPr lang="ko-KR" altLang="en-US" sz="1900" dirty="0">
+                          <a:solidFill>
+                            <a:schemeClr val="bg2">
+                              <a:lumMod val="25000"/>
+                            </a:schemeClr>
+                          </a:solidFill>
+                          <a:latin typeface="Arial" panose="020B0604020202020204" pitchFamily="34" charset="0"/>
+                          <a:cs typeface="Arial" panose="020B0604020202020204" pitchFamily="34" charset="0"/>
+                        </a:rPr>
+                        <a:t>복지 정책과</a:t>
+                      </a:r>
+                    </a:p>
+                  </a:txBody>
+                  <a:tcPr marL="97914" marR="97914" marT="48957" marB="48957" anchor="ctr">
+                    <a:lnL>
+                      <a:noFill/>
+                    </a:lnL>
+                    <a:lnR w="6350" cap="flat" cmpd="sng" algn="ctr">
+                      <a:solidFill>
+                        <a:schemeClr val="bg1">
+                          <a:lumMod val="65000"/>
+                        </a:schemeClr>
+                      </a:solidFill>
+                      <a:prstDash val="solid"/>
+                      <a:round/>
+                      <a:headEnd type="none" w="med" len="med"/>
+                      <a:tailEnd type="none" w="med" len="med"/>
+                    </a:lnR>
+                    <a:lnT w="6350" cap="flat" cmpd="sng" algn="ctr">
+                      <a:solidFill>
+                        <a:schemeClr val="bg1">
+                          <a:lumMod val="65000"/>
+                        </a:schemeClr>
+                      </a:solidFill>
+                      <a:prstDash val="solid"/>
+                      <a:round/>
+                      <a:headEnd type="none" w="med" len="med"/>
+                      <a:tailEnd type="none" w="med" len="med"/>
+                    </a:lnT>
+                    <a:lnB w="6350" cap="flat" cmpd="sng" algn="ctr">
+                      <a:solidFill>
+                        <a:schemeClr val="bg1">
+                          <a:lumMod val="65000"/>
+                        </a:schemeClr>
+                      </a:solidFill>
+                      <a:prstDash val="solid"/>
+                      <a:round/>
+                      <a:headEnd type="none" w="med" len="med"/>
+                      <a:tailEnd type="none" w="med" len="med"/>
+                    </a:lnB>
+                    <a:lnTlToBr w="12700" cmpd="sng">
+                      <a:noFill/>
+                      <a:prstDash val="solid"/>
+                    </a:lnTlToBr>
+                    <a:lnBlToTr w="12700" cmpd="sng">
+                      <a:noFill/>
+                      <a:prstDash val="solid"/>
+                    </a:lnBlToTr>
+                    <a:solidFill>
+                      <a:schemeClr val="bg1"/>
+                    </a:solidFill>
+                  </a:tcPr>
+                </a:tc>
+                <a:tc>
+                  <a:txBody>
+                    <a:bodyPr/>
+                    <a:lstStyle/>
+                    <a:p>
+                      <a:pPr algn="ctr" latinLnBrk="1"/>
+                      <a:r>
+                        <a:rPr lang="en-US" altLang="ko-KR" sz="1900" dirty="0">
+                          <a:solidFill>
+                            <a:schemeClr val="bg2">
+                              <a:lumMod val="25000"/>
+                            </a:schemeClr>
+                          </a:solidFill>
+                          <a:latin typeface="Arial" panose="020B0604020202020204" pitchFamily="34" charset="0"/>
+                          <a:cs typeface="Arial" panose="020B0604020202020204" pitchFamily="34" charset="0"/>
+                        </a:rPr>
+                        <a:t>574,616,284</a:t>
+                      </a:r>
+                      <a:endParaRPr lang="ko-KR" altLang="en-US" sz="1900" dirty="0">
+                        <a:solidFill>
+                          <a:schemeClr val="bg2">
+                            <a:lumMod val="25000"/>
+                          </a:schemeClr>
+                        </a:solidFill>
+                        <a:latin typeface="Arial" panose="020B0604020202020204" pitchFamily="34" charset="0"/>
+                        <a:cs typeface="Arial" panose="020B0604020202020204" pitchFamily="34" charset="0"/>
+                      </a:endParaRPr>
+                    </a:p>
+                  </a:txBody>
+                  <a:tcPr marL="97914" marR="97914" marT="48957" marB="48957" anchor="ctr">
+                    <a:lnL w="6350" cap="flat" cmpd="sng" algn="ctr">
+                      <a:solidFill>
+                        <a:schemeClr val="bg1">
+                          <a:lumMod val="65000"/>
+                        </a:schemeClr>
+                      </a:solidFill>
+                      <a:prstDash val="solid"/>
+                      <a:round/>
+                      <a:headEnd type="none" w="med" len="med"/>
+                      <a:tailEnd type="none" w="med" len="med"/>
+                    </a:lnL>
+                    <a:lnR w="6350" cap="flat" cmpd="sng" algn="ctr">
+                      <a:solidFill>
+                        <a:schemeClr val="bg1">
+                          <a:lumMod val="65000"/>
+                        </a:schemeClr>
+                      </a:solidFill>
+                      <a:prstDash val="solid"/>
+                      <a:round/>
+                      <a:headEnd type="none" w="med" len="med"/>
+                      <a:tailEnd type="none" w="med" len="med"/>
+                    </a:lnR>
+                    <a:lnT w="6350" cap="flat" cmpd="sng" algn="ctr">
+                      <a:solidFill>
+                        <a:schemeClr val="bg1">
+                          <a:lumMod val="65000"/>
+                        </a:schemeClr>
+                      </a:solidFill>
+                      <a:prstDash val="solid"/>
+                      <a:round/>
+                      <a:headEnd type="none" w="med" len="med"/>
+                      <a:tailEnd type="none" w="med" len="med"/>
+                    </a:lnT>
+                    <a:lnB w="6350" cap="flat" cmpd="sng" algn="ctr">
+                      <a:solidFill>
+                        <a:schemeClr val="bg1">
+                          <a:lumMod val="65000"/>
+                        </a:schemeClr>
+                      </a:solidFill>
+                      <a:prstDash val="solid"/>
+                      <a:round/>
+                      <a:headEnd type="none" w="med" len="med"/>
+                      <a:tailEnd type="none" w="med" len="med"/>
+                    </a:lnB>
+                    <a:lnTlToBr w="12700" cmpd="sng">
+                      <a:noFill/>
+                      <a:prstDash val="solid"/>
+                    </a:lnTlToBr>
+                    <a:lnBlToTr w="12700" cmpd="sng">
+                      <a:noFill/>
+                      <a:prstDash val="solid"/>
+                    </a:lnBlToTr>
+                    <a:solidFill>
+                      <a:schemeClr val="bg1"/>
+                    </a:solidFill>
+                  </a:tcPr>
+                </a:tc>
+                <a:tc>
+                  <a:txBody>
+                    <a:bodyPr/>
+                    <a:lstStyle/>
+                    <a:p>
+                      <a:pPr algn="ctr" latinLnBrk="1"/>
+                      <a:r>
+                        <a:rPr lang="en-US" altLang="ko-KR" sz="1900" dirty="0">
+                          <a:solidFill>
+                            <a:schemeClr val="bg2">
+                              <a:lumMod val="25000"/>
+                            </a:schemeClr>
+                          </a:solidFill>
+                          <a:latin typeface="Arial" panose="020B0604020202020204" pitchFamily="34" charset="0"/>
+                          <a:cs typeface="Arial" panose="020B0604020202020204" pitchFamily="34" charset="0"/>
+                        </a:rPr>
+                        <a:t>515,529,619</a:t>
+                      </a:r>
+                      <a:endParaRPr lang="ko-KR" altLang="en-US" sz="1900" dirty="0">
+                        <a:solidFill>
+                          <a:schemeClr val="bg2">
+                            <a:lumMod val="25000"/>
+                          </a:schemeClr>
+                        </a:solidFill>
+                        <a:latin typeface="Arial" panose="020B0604020202020204" pitchFamily="34" charset="0"/>
+                        <a:cs typeface="Arial" panose="020B0604020202020204" pitchFamily="34" charset="0"/>
+                      </a:endParaRPr>
+                    </a:p>
+                  </a:txBody>
+                  <a:tcPr marL="97914" marR="97914" marT="48957" marB="48957" anchor="ctr">
+                    <a:lnL w="6350" cap="flat" cmpd="sng" algn="ctr">
+                      <a:solidFill>
+                        <a:schemeClr val="bg1">
+                          <a:lumMod val="65000"/>
+                        </a:schemeClr>
+                      </a:solidFill>
+                      <a:prstDash val="solid"/>
+                      <a:round/>
+                      <a:headEnd type="none" w="med" len="med"/>
+                      <a:tailEnd type="none" w="med" len="med"/>
+                    </a:lnL>
+                    <a:lnR w="6350" cap="flat" cmpd="sng" algn="ctr">
+                      <a:solidFill>
+                        <a:schemeClr val="bg1">
+                          <a:lumMod val="65000"/>
+                        </a:schemeClr>
+                      </a:solidFill>
+                      <a:prstDash val="solid"/>
+                      <a:round/>
+                      <a:headEnd type="none" w="med" len="med"/>
+                      <a:tailEnd type="none" w="med" len="med"/>
+                    </a:lnR>
+                    <a:lnT w="6350" cap="flat" cmpd="sng" algn="ctr">
+                      <a:solidFill>
+                        <a:schemeClr val="bg1">
+                          <a:lumMod val="65000"/>
+                        </a:schemeClr>
+                      </a:solidFill>
+                      <a:prstDash val="solid"/>
+                      <a:round/>
+                      <a:headEnd type="none" w="med" len="med"/>
+                      <a:tailEnd type="none" w="med" len="med"/>
+                    </a:lnT>
+                    <a:lnB w="6350" cap="flat" cmpd="sng" algn="ctr">
+                      <a:solidFill>
+                        <a:schemeClr val="bg1">
+                          <a:lumMod val="65000"/>
+                        </a:schemeClr>
+                      </a:solidFill>
+                      <a:prstDash val="solid"/>
+                      <a:round/>
+                      <a:headEnd type="none" w="med" len="med"/>
+                      <a:tailEnd type="none" w="med" len="med"/>
+                    </a:lnB>
+                    <a:lnTlToBr w="12700" cmpd="sng">
+                      <a:noFill/>
+                      <a:prstDash val="solid"/>
+                    </a:lnTlToBr>
+                    <a:lnBlToTr w="12700" cmpd="sng">
+                      <a:noFill/>
+                      <a:prstDash val="solid"/>
+                    </a:lnBlToTr>
+                    <a:solidFill>
+                      <a:schemeClr val="bg1"/>
+                    </a:solidFill>
+                  </a:tcPr>
+                </a:tc>
+                <a:tc>
+                  <a:txBody>
+                    <a:bodyPr/>
+                    <a:lstStyle/>
+                    <a:p>
+                      <a:pPr algn="ctr" latinLnBrk="1"/>
+                      <a:r>
+                        <a:rPr lang="en-US" altLang="ko-KR" sz="1900" dirty="0">
+                          <a:solidFill>
+                            <a:schemeClr val="bg2">
+                              <a:lumMod val="25000"/>
+                            </a:schemeClr>
+                          </a:solidFill>
+                          <a:latin typeface="Arial" panose="020B0604020202020204" pitchFamily="34" charset="0"/>
+                          <a:cs typeface="Arial" panose="020B0604020202020204" pitchFamily="34" charset="0"/>
+                        </a:rPr>
+                        <a:t>11.46%</a:t>
+                      </a:r>
+                      <a:endParaRPr lang="ko-KR" altLang="en-US" sz="1900" dirty="0">
+                        <a:solidFill>
+                          <a:schemeClr val="bg2">
+                            <a:lumMod val="25000"/>
+                          </a:schemeClr>
+                        </a:solidFill>
+                        <a:latin typeface="Arial" panose="020B0604020202020204" pitchFamily="34" charset="0"/>
+                        <a:cs typeface="Arial" panose="020B0604020202020204" pitchFamily="34" charset="0"/>
+                      </a:endParaRPr>
+                    </a:p>
+                  </a:txBody>
+                  <a:tcPr marL="97914" marR="97914" marT="48957" marB="48957" anchor="ctr">
+                    <a:lnL w="6350" cap="flat" cmpd="sng" algn="ctr">
+                      <a:solidFill>
+                        <a:schemeClr val="bg1">
+                          <a:lumMod val="65000"/>
+                        </a:schemeClr>
+                      </a:solidFill>
+                      <a:prstDash val="solid"/>
+                      <a:round/>
+                      <a:headEnd type="none" w="med" len="med"/>
+                      <a:tailEnd type="none" w="med" len="med"/>
+                    </a:lnL>
+                    <a:lnR w="6350" cap="flat" cmpd="sng" algn="ctr">
+                      <a:noFill/>
+                      <a:prstDash val="solid"/>
+                      <a:round/>
+                      <a:headEnd type="none" w="med" len="med"/>
+                      <a:tailEnd type="none" w="med" len="med"/>
+                    </a:lnR>
+                    <a:lnT w="6350" cap="flat" cmpd="sng" algn="ctr">
+                      <a:solidFill>
+                        <a:schemeClr val="bg1">
+                          <a:lumMod val="65000"/>
+                        </a:schemeClr>
+                      </a:solidFill>
+                      <a:prstDash val="solid"/>
+                      <a:round/>
+                      <a:headEnd type="none" w="med" len="med"/>
+                      <a:tailEnd type="none" w="med" len="med"/>
+                    </a:lnT>
+                    <a:lnB w="6350" cap="flat" cmpd="sng" algn="ctr">
+                      <a:solidFill>
+                        <a:schemeClr val="bg1">
+                          <a:lumMod val="65000"/>
+                        </a:schemeClr>
+                      </a:solidFill>
+                      <a:prstDash val="solid"/>
+                      <a:round/>
+                      <a:headEnd type="none" w="med" len="med"/>
+                      <a:tailEnd type="none" w="med" len="med"/>
+                    </a:lnB>
+                    <a:lnTlToBr w="12700" cmpd="sng">
+                      <a:noFill/>
+                      <a:prstDash val="solid"/>
+                    </a:lnTlToBr>
+                    <a:lnBlToTr w="12700" cmpd="sng">
+                      <a:noFill/>
+                      <a:prstDash val="solid"/>
+                    </a:lnBlToTr>
+                    <a:solidFill>
+                      <a:schemeClr val="bg1"/>
+                    </a:solidFill>
+                  </a:tcPr>
+                </a:tc>
+                <a:extLst>
+                  <a:ext uri="{0D108BD9-81ED-4DB2-BD59-A6C34878D82A}">
+                    <a16:rowId xmlns:a16="http://schemas.microsoft.com/office/drawing/2014/main" val="10002"/>
+                  </a:ext>
+                </a:extLst>
+              </a:tr>
+              <a:tr h="714864">
+                <a:tc>
+                  <a:txBody>
+                    <a:bodyPr/>
+                    <a:lstStyle/>
+                    <a:p>
+                      <a:pPr marL="0" marR="0" indent="0" algn="ctr" defTabSz="914400" rtl="0" eaLnBrk="1" fontAlgn="auto" latinLnBrk="1" hangingPunct="1">
+                        <a:lnSpc>
+                          <a:spcPct val="100000"/>
+                        </a:lnSpc>
+                        <a:spcBef>
+                          <a:spcPts val="0"/>
+                        </a:spcBef>
+                        <a:spcAft>
+                          <a:spcPts val="0"/>
+                        </a:spcAft>
+                        <a:buClrTx/>
+                        <a:buSzTx/>
+                        <a:buFontTx/>
+                        <a:buNone/>
+                        <a:tabLst/>
+                        <a:defRPr/>
+                      </a:pPr>
+                      <a:r>
+                        <a:rPr lang="ko-KR" altLang="en-US" sz="1900" dirty="0">
+                          <a:solidFill>
+                            <a:schemeClr val="bg2">
+                              <a:lumMod val="25000"/>
+                            </a:schemeClr>
+                          </a:solidFill>
+                          <a:latin typeface="Arial" panose="020B0604020202020204" pitchFamily="34" charset="0"/>
+                          <a:cs typeface="Arial" panose="020B0604020202020204" pitchFamily="34" charset="0"/>
+                        </a:rPr>
+                        <a:t>어르신복지과</a:t>
+                      </a:r>
+                    </a:p>
+                  </a:txBody>
+                  <a:tcPr marL="97914" marR="97914" marT="48957" marB="48957" anchor="ctr">
+                    <a:lnL>
+                      <a:noFill/>
+                    </a:lnL>
+                    <a:lnR w="6350" cap="flat" cmpd="sng" algn="ctr">
+                      <a:solidFill>
+                        <a:schemeClr val="bg1">
+                          <a:lumMod val="65000"/>
+                        </a:schemeClr>
+                      </a:solidFill>
+                      <a:prstDash val="solid"/>
+                      <a:round/>
+                      <a:headEnd type="none" w="med" len="med"/>
+                      <a:tailEnd type="none" w="med" len="med"/>
+                    </a:lnR>
+                    <a:lnT w="6350" cap="flat" cmpd="sng" algn="ctr">
+                      <a:solidFill>
+                        <a:schemeClr val="bg1">
+                          <a:lumMod val="65000"/>
+                        </a:schemeClr>
+                      </a:solidFill>
+                      <a:prstDash val="solid"/>
+                      <a:round/>
+                      <a:headEnd type="none" w="med" len="med"/>
+                      <a:tailEnd type="none" w="med" len="med"/>
+                    </a:lnT>
+                    <a:lnB w="6350" cap="flat" cmpd="sng" algn="ctr">
+                      <a:solidFill>
+                        <a:schemeClr val="bg1">
+                          <a:lumMod val="65000"/>
+                        </a:schemeClr>
+                      </a:solidFill>
+                      <a:prstDash val="solid"/>
+                      <a:round/>
+                      <a:headEnd type="none" w="med" len="med"/>
+                      <a:tailEnd type="none" w="med" len="med"/>
+                    </a:lnB>
+                    <a:lnTlToBr w="12700" cmpd="sng">
+                      <a:noFill/>
+                      <a:prstDash val="solid"/>
+                    </a:lnTlToBr>
+                    <a:lnBlToTr w="12700" cmpd="sng">
+                      <a:noFill/>
+                      <a:prstDash val="solid"/>
+                    </a:lnBlToTr>
+                    <a:solidFill>
+                      <a:srgbClr val="FFC000"/>
+                    </a:solidFill>
+                  </a:tcPr>
+                </a:tc>
+                <a:tc>
+                  <a:txBody>
+                    <a:bodyPr/>
+                    <a:lstStyle/>
+                    <a:p>
+                      <a:pPr marL="0" marR="0" indent="0" algn="ctr" defTabSz="914400" rtl="0" eaLnBrk="1" fontAlgn="auto" latinLnBrk="1" hangingPunct="1">
+                        <a:lnSpc>
+                          <a:spcPct val="100000"/>
+                        </a:lnSpc>
+                        <a:spcBef>
+                          <a:spcPts val="0"/>
+                        </a:spcBef>
+                        <a:spcAft>
+                          <a:spcPts val="0"/>
+                        </a:spcAft>
+                        <a:buClrTx/>
+                        <a:buSzTx/>
+                        <a:buFontTx/>
+                        <a:buNone/>
+                        <a:tabLst/>
+                        <a:defRPr/>
+                      </a:pPr>
+                      <a:r>
+                        <a:rPr lang="en-US" altLang="ko-KR" sz="1900" dirty="0">
+                          <a:solidFill>
+                            <a:schemeClr val="bg2">
+                              <a:lumMod val="25000"/>
+                            </a:schemeClr>
+                          </a:solidFill>
+                          <a:latin typeface="Arial" panose="020B0604020202020204" pitchFamily="34" charset="0"/>
+                          <a:cs typeface="Arial" panose="020B0604020202020204" pitchFamily="34" charset="0"/>
+                        </a:rPr>
+                        <a:t>1,371,484,415</a:t>
+                      </a:r>
+                      <a:endParaRPr lang="ko-KR" altLang="en-US" sz="1900" dirty="0">
+                        <a:solidFill>
+                          <a:schemeClr val="bg2">
+                            <a:lumMod val="25000"/>
+                          </a:schemeClr>
+                        </a:solidFill>
+                        <a:latin typeface="Arial" panose="020B0604020202020204" pitchFamily="34" charset="0"/>
+                        <a:cs typeface="Arial" panose="020B0604020202020204" pitchFamily="34" charset="0"/>
+                      </a:endParaRPr>
+                    </a:p>
+                  </a:txBody>
+                  <a:tcPr marL="97914" marR="97914" marT="48957" marB="48957" anchor="ctr">
+                    <a:lnL w="6350" cap="flat" cmpd="sng" algn="ctr">
+                      <a:solidFill>
+                        <a:schemeClr val="bg1">
+                          <a:lumMod val="65000"/>
+                        </a:schemeClr>
+                      </a:solidFill>
+                      <a:prstDash val="solid"/>
+                      <a:round/>
+                      <a:headEnd type="none" w="med" len="med"/>
+                      <a:tailEnd type="none" w="med" len="med"/>
+                    </a:lnL>
+                    <a:lnR w="6350" cap="flat" cmpd="sng" algn="ctr">
+                      <a:solidFill>
+                        <a:schemeClr val="bg1">
+                          <a:lumMod val="65000"/>
+                        </a:schemeClr>
+                      </a:solidFill>
+                      <a:prstDash val="solid"/>
+                      <a:round/>
+                      <a:headEnd type="none" w="med" len="med"/>
+                      <a:tailEnd type="none" w="med" len="med"/>
+                    </a:lnR>
+                    <a:lnT w="6350" cap="flat" cmpd="sng" algn="ctr">
+                      <a:solidFill>
+                        <a:schemeClr val="bg1">
+                          <a:lumMod val="65000"/>
+                        </a:schemeClr>
+                      </a:solidFill>
+                      <a:prstDash val="solid"/>
+                      <a:round/>
+                      <a:headEnd type="none" w="med" len="med"/>
+                      <a:tailEnd type="none" w="med" len="med"/>
+                    </a:lnT>
+                    <a:lnB w="6350" cap="flat" cmpd="sng" algn="ctr">
+                      <a:solidFill>
+                        <a:schemeClr val="bg1">
+                          <a:lumMod val="65000"/>
+                        </a:schemeClr>
+                      </a:solidFill>
+                      <a:prstDash val="solid"/>
+                      <a:round/>
+                      <a:headEnd type="none" w="med" len="med"/>
+                      <a:tailEnd type="none" w="med" len="med"/>
+                    </a:lnB>
+                    <a:lnTlToBr w="12700" cmpd="sng">
+                      <a:noFill/>
+                      <a:prstDash val="solid"/>
+                    </a:lnTlToBr>
+                    <a:lnBlToTr w="12700" cmpd="sng">
+                      <a:noFill/>
+                      <a:prstDash val="solid"/>
+                    </a:lnBlToTr>
+                    <a:solidFill>
+                      <a:srgbClr val="FFC000"/>
+                    </a:solidFill>
+                  </a:tcPr>
+                </a:tc>
+                <a:tc>
+                  <a:txBody>
+                    <a:bodyPr/>
+                    <a:lstStyle/>
+                    <a:p>
+                      <a:pPr marL="0" marR="0" indent="0" algn="ctr" defTabSz="914400" rtl="0" eaLnBrk="1" fontAlgn="auto" latinLnBrk="1" hangingPunct="1">
+                        <a:lnSpc>
+                          <a:spcPct val="100000"/>
+                        </a:lnSpc>
+                        <a:spcBef>
+                          <a:spcPts val="0"/>
+                        </a:spcBef>
+                        <a:spcAft>
+                          <a:spcPts val="0"/>
+                        </a:spcAft>
+                        <a:buClrTx/>
+                        <a:buSzTx/>
+                        <a:buFontTx/>
+                        <a:buNone/>
+                        <a:tabLst/>
+                        <a:defRPr/>
+                      </a:pPr>
+                      <a:r>
+                        <a:rPr lang="en-US" altLang="ko-KR" sz="1900" dirty="0">
+                          <a:solidFill>
+                            <a:schemeClr val="bg2">
+                              <a:lumMod val="25000"/>
+                            </a:schemeClr>
+                          </a:solidFill>
+                          <a:latin typeface="Arial" panose="020B0604020202020204" pitchFamily="34" charset="0"/>
+                          <a:cs typeface="Arial" panose="020B0604020202020204" pitchFamily="34" charset="0"/>
+                        </a:rPr>
+                        <a:t>1,238,558,681</a:t>
+                      </a:r>
+                      <a:endParaRPr lang="ko-KR" altLang="en-US" sz="1900" dirty="0">
+                        <a:solidFill>
+                          <a:schemeClr val="bg2">
+                            <a:lumMod val="25000"/>
+                          </a:schemeClr>
+                        </a:solidFill>
+                        <a:latin typeface="Arial" panose="020B0604020202020204" pitchFamily="34" charset="0"/>
+                        <a:cs typeface="Arial" panose="020B0604020202020204" pitchFamily="34" charset="0"/>
+                      </a:endParaRPr>
+                    </a:p>
+                  </a:txBody>
+                  <a:tcPr marL="97914" marR="97914" marT="48957" marB="48957" anchor="ctr">
+                    <a:lnL w="6350" cap="flat" cmpd="sng" algn="ctr">
+                      <a:solidFill>
+                        <a:schemeClr val="bg1">
+                          <a:lumMod val="65000"/>
+                        </a:schemeClr>
+                      </a:solidFill>
+                      <a:prstDash val="solid"/>
+                      <a:round/>
+                      <a:headEnd type="none" w="med" len="med"/>
+                      <a:tailEnd type="none" w="med" len="med"/>
+                    </a:lnL>
+                    <a:lnR w="6350" cap="flat" cmpd="sng" algn="ctr">
+                      <a:solidFill>
+                        <a:schemeClr val="bg1">
+                          <a:lumMod val="65000"/>
+                        </a:schemeClr>
+                      </a:solidFill>
+                      <a:prstDash val="solid"/>
+                      <a:round/>
+                      <a:headEnd type="none" w="med" len="med"/>
+                      <a:tailEnd type="none" w="med" len="med"/>
+                    </a:lnR>
+                    <a:lnT w="6350" cap="flat" cmpd="sng" algn="ctr">
+                      <a:solidFill>
+                        <a:schemeClr val="bg1">
+                          <a:lumMod val="65000"/>
+                        </a:schemeClr>
+                      </a:solidFill>
+                      <a:prstDash val="solid"/>
+                      <a:round/>
+                      <a:headEnd type="none" w="med" len="med"/>
+                      <a:tailEnd type="none" w="med" len="med"/>
+                    </a:lnT>
+                    <a:lnB w="6350" cap="flat" cmpd="sng" algn="ctr">
+                      <a:solidFill>
+                        <a:schemeClr val="bg1">
+                          <a:lumMod val="65000"/>
+                        </a:schemeClr>
+                      </a:solidFill>
+                      <a:prstDash val="solid"/>
+                      <a:round/>
+                      <a:headEnd type="none" w="med" len="med"/>
+                      <a:tailEnd type="none" w="med" len="med"/>
+                    </a:lnB>
+                    <a:lnTlToBr w="12700" cmpd="sng">
+                      <a:noFill/>
+                      <a:prstDash val="solid"/>
+                    </a:lnTlToBr>
+                    <a:lnBlToTr w="12700" cmpd="sng">
+                      <a:noFill/>
+                      <a:prstDash val="solid"/>
+                    </a:lnBlToTr>
+                    <a:solidFill>
+                      <a:srgbClr val="FFC000"/>
+                    </a:solidFill>
+                  </a:tcPr>
+                </a:tc>
+                <a:tc>
+                  <a:txBody>
+                    <a:bodyPr/>
+                    <a:lstStyle/>
+                    <a:p>
+                      <a:pPr marL="0" marR="0" indent="0" algn="ctr" defTabSz="914400" rtl="0" eaLnBrk="1" fontAlgn="auto" latinLnBrk="1" hangingPunct="1">
+                        <a:lnSpc>
+                          <a:spcPct val="100000"/>
+                        </a:lnSpc>
+                        <a:spcBef>
+                          <a:spcPts val="0"/>
+                        </a:spcBef>
+                        <a:spcAft>
+                          <a:spcPts val="0"/>
+                        </a:spcAft>
+                        <a:buClrTx/>
+                        <a:buSzTx/>
+                        <a:buFontTx/>
+                        <a:buNone/>
+                        <a:tabLst/>
+                        <a:defRPr/>
+                      </a:pPr>
+                      <a:r>
+                        <a:rPr lang="en-US" altLang="ko-KR" sz="1900" dirty="0">
+                          <a:solidFill>
+                            <a:schemeClr val="bg2">
+                              <a:lumMod val="25000"/>
+                            </a:schemeClr>
+                          </a:solidFill>
+                          <a:latin typeface="Arial" panose="020B0604020202020204" pitchFamily="34" charset="0"/>
+                          <a:cs typeface="Arial" panose="020B0604020202020204" pitchFamily="34" charset="0"/>
+                        </a:rPr>
+                        <a:t>10.73%</a:t>
+                      </a:r>
+                      <a:endParaRPr lang="ko-KR" altLang="en-US" sz="1900" dirty="0">
+                        <a:solidFill>
+                          <a:schemeClr val="bg2">
+                            <a:lumMod val="25000"/>
+                          </a:schemeClr>
+                        </a:solidFill>
+                        <a:latin typeface="Arial" panose="020B0604020202020204" pitchFamily="34" charset="0"/>
+                        <a:cs typeface="Arial" panose="020B0604020202020204" pitchFamily="34" charset="0"/>
+                      </a:endParaRPr>
+                    </a:p>
+                  </a:txBody>
+                  <a:tcPr marL="97914" marR="97914" marT="48957" marB="48957" anchor="ctr">
+                    <a:lnL w="6350" cap="flat" cmpd="sng" algn="ctr">
+                      <a:solidFill>
+                        <a:schemeClr val="bg1">
+                          <a:lumMod val="65000"/>
+                        </a:schemeClr>
+                      </a:solidFill>
+                      <a:prstDash val="solid"/>
+                      <a:round/>
+                      <a:headEnd type="none" w="med" len="med"/>
+                      <a:tailEnd type="none" w="med" len="med"/>
+                    </a:lnL>
+                    <a:lnR w="6350" cap="flat" cmpd="sng" algn="ctr">
+                      <a:noFill/>
+                      <a:prstDash val="solid"/>
+                      <a:round/>
+                      <a:headEnd type="none" w="med" len="med"/>
+                      <a:tailEnd type="none" w="med" len="med"/>
+                    </a:lnR>
+                    <a:lnT w="6350" cap="flat" cmpd="sng" algn="ctr">
+                      <a:solidFill>
+                        <a:schemeClr val="bg1">
+                          <a:lumMod val="65000"/>
+                        </a:schemeClr>
+                      </a:solidFill>
+                      <a:prstDash val="solid"/>
+                      <a:round/>
+                      <a:headEnd type="none" w="med" len="med"/>
+                      <a:tailEnd type="none" w="med" len="med"/>
+                    </a:lnT>
+                    <a:lnB w="6350" cap="flat" cmpd="sng" algn="ctr">
+                      <a:solidFill>
+                        <a:schemeClr val="bg1">
+                          <a:lumMod val="65000"/>
+                        </a:schemeClr>
+                      </a:solidFill>
+                      <a:prstDash val="solid"/>
+                      <a:round/>
+                      <a:headEnd type="none" w="med" len="med"/>
+                      <a:tailEnd type="none" w="med" len="med"/>
+                    </a:lnB>
+                    <a:lnTlToBr w="12700" cmpd="sng">
+                      <a:noFill/>
+                      <a:prstDash val="solid"/>
+                    </a:lnTlToBr>
+                    <a:lnBlToTr w="12700" cmpd="sng">
+                      <a:noFill/>
+                      <a:prstDash val="solid"/>
+                    </a:lnBlToTr>
+                    <a:solidFill>
+                      <a:srgbClr val="FFC000"/>
+                    </a:solidFill>
+                  </a:tcPr>
+                </a:tc>
+                <a:extLst>
+                  <a:ext uri="{0D108BD9-81ED-4DB2-BD59-A6C34878D82A}">
+                    <a16:rowId xmlns:a16="http://schemas.microsoft.com/office/drawing/2014/main" val="10003"/>
+                  </a:ext>
+                </a:extLst>
+              </a:tr>
+              <a:tr h="714864">
+                <a:tc>
+                  <a:txBody>
+                    <a:bodyPr/>
+                    <a:lstStyle/>
+                    <a:p>
+                      <a:pPr algn="ctr" latinLnBrk="1"/>
+                      <a:r>
+                        <a:rPr lang="ko-KR" altLang="en-US" sz="1900" dirty="0">
+                          <a:solidFill>
+                            <a:schemeClr val="bg2">
+                              <a:lumMod val="25000"/>
+                            </a:schemeClr>
+                          </a:solidFill>
+                          <a:latin typeface="Arial" panose="020B0604020202020204" pitchFamily="34" charset="0"/>
+                          <a:cs typeface="Arial" panose="020B0604020202020204" pitchFamily="34" charset="0"/>
+                        </a:rPr>
+                        <a:t>희망복지과</a:t>
+                      </a:r>
+                    </a:p>
+                  </a:txBody>
+                  <a:tcPr marL="97914" marR="97914" marT="48957" marB="48957" anchor="ctr">
+                    <a:lnL>
+                      <a:noFill/>
+                    </a:lnL>
+                    <a:lnR w="6350" cap="flat" cmpd="sng" algn="ctr">
+                      <a:solidFill>
+                        <a:schemeClr val="bg1">
+                          <a:lumMod val="65000"/>
+                        </a:schemeClr>
+                      </a:solidFill>
+                      <a:prstDash val="solid"/>
+                      <a:round/>
+                      <a:headEnd type="none" w="med" len="med"/>
+                      <a:tailEnd type="none" w="med" len="med"/>
+                    </a:lnR>
+                    <a:lnT w="6350" cap="flat" cmpd="sng" algn="ctr">
+                      <a:solidFill>
+                        <a:schemeClr val="bg1">
+                          <a:lumMod val="65000"/>
+                        </a:schemeClr>
+                      </a:solidFill>
+                      <a:prstDash val="solid"/>
+                      <a:round/>
+                      <a:headEnd type="none" w="med" len="med"/>
+                      <a:tailEnd type="none" w="med" len="med"/>
+                    </a:lnT>
+                    <a:lnB w="6350" cap="flat" cmpd="sng" algn="ctr">
+                      <a:solidFill>
+                        <a:schemeClr val="bg1">
+                          <a:lumMod val="65000"/>
+                        </a:schemeClr>
+                      </a:solidFill>
+                      <a:prstDash val="solid"/>
+                      <a:round/>
+                      <a:headEnd type="none" w="med" len="med"/>
+                      <a:tailEnd type="none" w="med" len="med"/>
+                    </a:lnB>
+                    <a:lnTlToBr w="12700" cmpd="sng">
+                      <a:noFill/>
+                      <a:prstDash val="solid"/>
+                    </a:lnTlToBr>
+                    <a:lnBlToTr w="12700" cmpd="sng">
+                      <a:noFill/>
+                      <a:prstDash val="solid"/>
+                    </a:lnBlToTr>
+                    <a:solidFill>
+                      <a:schemeClr val="bg1"/>
+                    </a:solidFill>
+                  </a:tcPr>
+                </a:tc>
+                <a:tc>
+                  <a:txBody>
+                    <a:bodyPr/>
+                    <a:lstStyle/>
+                    <a:p>
+                      <a:pPr marL="0" marR="0" indent="0" algn="ctr" defTabSz="914400" rtl="0" eaLnBrk="1" fontAlgn="auto" latinLnBrk="1" hangingPunct="1">
+                        <a:lnSpc>
+                          <a:spcPct val="100000"/>
+                        </a:lnSpc>
+                        <a:spcBef>
+                          <a:spcPts val="0"/>
+                        </a:spcBef>
+                        <a:spcAft>
+                          <a:spcPts val="0"/>
+                        </a:spcAft>
+                        <a:buClrTx/>
+                        <a:buSzTx/>
+                        <a:buFontTx/>
+                        <a:buNone/>
+                        <a:tabLst/>
+                        <a:defRPr/>
+                      </a:pPr>
+                      <a:r>
+                        <a:rPr lang="en-US" altLang="ko-KR" sz="1900" dirty="0">
+                          <a:solidFill>
+                            <a:schemeClr val="bg2">
+                              <a:lumMod val="25000"/>
+                            </a:schemeClr>
+                          </a:solidFill>
+                          <a:latin typeface="Arial" panose="020B0604020202020204" pitchFamily="34" charset="0"/>
+                          <a:cs typeface="Arial" panose="020B0604020202020204" pitchFamily="34" charset="0"/>
+                        </a:rPr>
+                        <a:t>54,469,972</a:t>
+                      </a:r>
+                      <a:endParaRPr lang="ko-KR" altLang="en-US" sz="1900" dirty="0">
+                        <a:solidFill>
+                          <a:schemeClr val="bg2">
+                            <a:lumMod val="25000"/>
+                          </a:schemeClr>
+                        </a:solidFill>
+                        <a:latin typeface="Arial" panose="020B0604020202020204" pitchFamily="34" charset="0"/>
+                        <a:cs typeface="Arial" panose="020B0604020202020204" pitchFamily="34" charset="0"/>
+                      </a:endParaRPr>
+                    </a:p>
+                  </a:txBody>
+                  <a:tcPr marL="97914" marR="97914" marT="48957" marB="48957" anchor="ctr">
+                    <a:lnL w="6350" cap="flat" cmpd="sng" algn="ctr">
+                      <a:solidFill>
+                        <a:schemeClr val="bg1">
+                          <a:lumMod val="65000"/>
+                        </a:schemeClr>
+                      </a:solidFill>
+                      <a:prstDash val="solid"/>
+                      <a:round/>
+                      <a:headEnd type="none" w="med" len="med"/>
+                      <a:tailEnd type="none" w="med" len="med"/>
+                    </a:lnL>
+                    <a:lnR w="6350" cap="flat" cmpd="sng" algn="ctr">
+                      <a:solidFill>
+                        <a:schemeClr val="bg1">
+                          <a:lumMod val="65000"/>
+                        </a:schemeClr>
+                      </a:solidFill>
+                      <a:prstDash val="solid"/>
+                      <a:round/>
+                      <a:headEnd type="none" w="med" len="med"/>
+                      <a:tailEnd type="none" w="med" len="med"/>
+                    </a:lnR>
+                    <a:lnT w="6350" cap="flat" cmpd="sng" algn="ctr">
+                      <a:solidFill>
+                        <a:schemeClr val="bg1">
+                          <a:lumMod val="65000"/>
+                        </a:schemeClr>
+                      </a:solidFill>
+                      <a:prstDash val="solid"/>
+                      <a:round/>
+                      <a:headEnd type="none" w="med" len="med"/>
+                      <a:tailEnd type="none" w="med" len="med"/>
+                    </a:lnT>
+                    <a:lnB w="6350" cap="flat" cmpd="sng" algn="ctr">
+                      <a:solidFill>
+                        <a:schemeClr val="bg1">
+                          <a:lumMod val="65000"/>
+                        </a:schemeClr>
+                      </a:solidFill>
+                      <a:prstDash val="solid"/>
+                      <a:round/>
+                      <a:headEnd type="none" w="med" len="med"/>
+                      <a:tailEnd type="none" w="med" len="med"/>
+                    </a:lnB>
+                    <a:lnTlToBr w="12700" cmpd="sng">
+                      <a:noFill/>
+                      <a:prstDash val="solid"/>
+                    </a:lnTlToBr>
+                    <a:lnBlToTr w="12700" cmpd="sng">
+                      <a:noFill/>
+                      <a:prstDash val="solid"/>
+                    </a:lnBlToTr>
+                    <a:solidFill>
+                      <a:schemeClr val="bg1"/>
+                    </a:solidFill>
+                  </a:tcPr>
+                </a:tc>
+                <a:tc>
+                  <a:txBody>
+                    <a:bodyPr/>
+                    <a:lstStyle/>
+                    <a:p>
+                      <a:pPr marL="0" marR="0" indent="0" algn="ctr" defTabSz="914400" rtl="0" eaLnBrk="1" fontAlgn="auto" latinLnBrk="1" hangingPunct="1">
+                        <a:lnSpc>
+                          <a:spcPct val="100000"/>
+                        </a:lnSpc>
+                        <a:spcBef>
+                          <a:spcPts val="0"/>
+                        </a:spcBef>
+                        <a:spcAft>
+                          <a:spcPts val="0"/>
+                        </a:spcAft>
+                        <a:buClrTx/>
+                        <a:buSzTx/>
+                        <a:buFontTx/>
+                        <a:buNone/>
+                        <a:tabLst/>
+                        <a:defRPr/>
+                      </a:pPr>
+                      <a:r>
+                        <a:rPr lang="en-US" altLang="ko-KR" sz="1900" dirty="0">
+                          <a:solidFill>
+                            <a:schemeClr val="bg2">
+                              <a:lumMod val="25000"/>
+                            </a:schemeClr>
+                          </a:solidFill>
+                          <a:latin typeface="Arial" panose="020B0604020202020204" pitchFamily="34" charset="0"/>
+                          <a:cs typeface="Arial" panose="020B0604020202020204" pitchFamily="34" charset="0"/>
+                        </a:rPr>
+                        <a:t>48,198,590</a:t>
+                      </a:r>
+                      <a:endParaRPr lang="ko-KR" altLang="en-US" sz="1900" dirty="0">
+                        <a:solidFill>
+                          <a:schemeClr val="bg2">
+                            <a:lumMod val="25000"/>
+                          </a:schemeClr>
+                        </a:solidFill>
+                        <a:latin typeface="Arial" panose="020B0604020202020204" pitchFamily="34" charset="0"/>
+                        <a:cs typeface="Arial" panose="020B0604020202020204" pitchFamily="34" charset="0"/>
+                      </a:endParaRPr>
+                    </a:p>
+                  </a:txBody>
+                  <a:tcPr marL="97914" marR="97914" marT="48957" marB="48957" anchor="ctr">
+                    <a:lnL w="6350" cap="flat" cmpd="sng" algn="ctr">
+                      <a:solidFill>
+                        <a:schemeClr val="bg1">
+                          <a:lumMod val="65000"/>
+                        </a:schemeClr>
+                      </a:solidFill>
+                      <a:prstDash val="solid"/>
+                      <a:round/>
+                      <a:headEnd type="none" w="med" len="med"/>
+                      <a:tailEnd type="none" w="med" len="med"/>
+                    </a:lnL>
+                    <a:lnR w="6350" cap="flat" cmpd="sng" algn="ctr">
+                      <a:solidFill>
+                        <a:schemeClr val="bg1">
+                          <a:lumMod val="65000"/>
+                        </a:schemeClr>
+                      </a:solidFill>
+                      <a:prstDash val="solid"/>
+                      <a:round/>
+                      <a:headEnd type="none" w="med" len="med"/>
+                      <a:tailEnd type="none" w="med" len="med"/>
+                    </a:lnR>
+                    <a:lnT w="6350" cap="flat" cmpd="sng" algn="ctr">
+                      <a:solidFill>
+                        <a:schemeClr val="bg1">
+                          <a:lumMod val="65000"/>
+                        </a:schemeClr>
+                      </a:solidFill>
+                      <a:prstDash val="solid"/>
+                      <a:round/>
+                      <a:headEnd type="none" w="med" len="med"/>
+                      <a:tailEnd type="none" w="med" len="med"/>
+                    </a:lnT>
+                    <a:lnB w="6350" cap="flat" cmpd="sng" algn="ctr">
+                      <a:solidFill>
+                        <a:schemeClr val="bg1">
+                          <a:lumMod val="65000"/>
+                        </a:schemeClr>
+                      </a:solidFill>
+                      <a:prstDash val="solid"/>
+                      <a:round/>
+                      <a:headEnd type="none" w="med" len="med"/>
+                      <a:tailEnd type="none" w="med" len="med"/>
+                    </a:lnB>
+                    <a:lnTlToBr w="12700" cmpd="sng">
+                      <a:noFill/>
+                      <a:prstDash val="solid"/>
+                    </a:lnTlToBr>
+                    <a:lnBlToTr w="12700" cmpd="sng">
+                      <a:noFill/>
+                      <a:prstDash val="solid"/>
+                    </a:lnBlToTr>
+                    <a:solidFill>
+                      <a:schemeClr val="bg1"/>
+                    </a:solidFill>
+                  </a:tcPr>
+                </a:tc>
+                <a:tc>
+                  <a:txBody>
+                    <a:bodyPr/>
+                    <a:lstStyle/>
+                    <a:p>
+                      <a:pPr marL="0" marR="0" indent="0" algn="ctr" defTabSz="914400" rtl="0" eaLnBrk="1" fontAlgn="auto" latinLnBrk="1" hangingPunct="1">
+                        <a:lnSpc>
+                          <a:spcPct val="100000"/>
+                        </a:lnSpc>
+                        <a:spcBef>
+                          <a:spcPts val="0"/>
+                        </a:spcBef>
+                        <a:spcAft>
+                          <a:spcPts val="0"/>
+                        </a:spcAft>
+                        <a:buClrTx/>
+                        <a:buSzTx/>
+                        <a:buFontTx/>
+                        <a:buNone/>
+                        <a:tabLst/>
+                        <a:defRPr/>
+                      </a:pPr>
+                      <a:r>
+                        <a:rPr lang="en-US" altLang="ko-KR" sz="1900" dirty="0">
+                          <a:solidFill>
+                            <a:schemeClr val="bg2">
+                              <a:lumMod val="25000"/>
+                            </a:schemeClr>
+                          </a:solidFill>
+                          <a:latin typeface="Arial" panose="020B0604020202020204" pitchFamily="34" charset="0"/>
+                          <a:cs typeface="Arial" panose="020B0604020202020204" pitchFamily="34" charset="0"/>
+                        </a:rPr>
+                        <a:t>13.01%</a:t>
+                      </a:r>
+                      <a:endParaRPr lang="ko-KR" altLang="en-US" sz="1900" dirty="0">
+                        <a:solidFill>
+                          <a:schemeClr val="bg2">
+                            <a:lumMod val="25000"/>
+                          </a:schemeClr>
+                        </a:solidFill>
+                        <a:latin typeface="Arial" panose="020B0604020202020204" pitchFamily="34" charset="0"/>
+                        <a:cs typeface="Arial" panose="020B0604020202020204" pitchFamily="34" charset="0"/>
+                      </a:endParaRPr>
+                    </a:p>
+                  </a:txBody>
+                  <a:tcPr marL="97914" marR="97914" marT="48957" marB="48957" anchor="ctr">
+                    <a:lnL w="6350" cap="flat" cmpd="sng" algn="ctr">
+                      <a:solidFill>
+                        <a:schemeClr val="bg1">
+                          <a:lumMod val="65000"/>
+                        </a:schemeClr>
+                      </a:solidFill>
+                      <a:prstDash val="solid"/>
+                      <a:round/>
+                      <a:headEnd type="none" w="med" len="med"/>
+                      <a:tailEnd type="none" w="med" len="med"/>
+                    </a:lnL>
+                    <a:lnR w="6350" cap="flat" cmpd="sng" algn="ctr">
+                      <a:noFill/>
+                      <a:prstDash val="solid"/>
+                      <a:round/>
+                      <a:headEnd type="none" w="med" len="med"/>
+                      <a:tailEnd type="none" w="med" len="med"/>
+                    </a:lnR>
+                    <a:lnT w="6350" cap="flat" cmpd="sng" algn="ctr">
+                      <a:solidFill>
+                        <a:schemeClr val="bg1">
+                          <a:lumMod val="65000"/>
+                        </a:schemeClr>
+                      </a:solidFill>
+                      <a:prstDash val="solid"/>
+                      <a:round/>
+                      <a:headEnd type="none" w="med" len="med"/>
+                      <a:tailEnd type="none" w="med" len="med"/>
+                    </a:lnT>
+                    <a:lnB w="6350" cap="flat" cmpd="sng" algn="ctr">
+                      <a:solidFill>
+                        <a:schemeClr val="bg1">
+                          <a:lumMod val="65000"/>
+                        </a:schemeClr>
+                      </a:solidFill>
+                      <a:prstDash val="solid"/>
+                      <a:round/>
+                      <a:headEnd type="none" w="med" len="med"/>
+                      <a:tailEnd type="none" w="med" len="med"/>
+                    </a:lnB>
+                    <a:lnTlToBr w="12700" cmpd="sng">
+                      <a:noFill/>
+                      <a:prstDash val="solid"/>
+                    </a:lnTlToBr>
+                    <a:lnBlToTr w="12700" cmpd="sng">
+                      <a:noFill/>
+                      <a:prstDash val="solid"/>
+                    </a:lnBlToTr>
+                    <a:solidFill>
+                      <a:schemeClr val="bg1"/>
+                    </a:solidFill>
+                  </a:tcPr>
+                </a:tc>
+                <a:extLst>
+                  <a:ext uri="{0D108BD9-81ED-4DB2-BD59-A6C34878D82A}">
+                    <a16:rowId xmlns:a16="http://schemas.microsoft.com/office/drawing/2014/main" val="10004"/>
+                  </a:ext>
+                </a:extLst>
+              </a:tr>
+              <a:tr h="714864">
+                <a:tc>
+                  <a:txBody>
+                    <a:bodyPr/>
+                    <a:lstStyle/>
+                    <a:p>
+                      <a:pPr marL="0" marR="0" indent="0" algn="ctr" defTabSz="914400" rtl="0" eaLnBrk="1" fontAlgn="auto" latinLnBrk="1" hangingPunct="1">
+                        <a:lnSpc>
+                          <a:spcPct val="100000"/>
+                        </a:lnSpc>
+                        <a:spcBef>
+                          <a:spcPts val="0"/>
+                        </a:spcBef>
+                        <a:spcAft>
+                          <a:spcPts val="0"/>
+                        </a:spcAft>
+                        <a:buClrTx/>
+                        <a:buSzTx/>
+                        <a:buFontTx/>
+                        <a:buNone/>
+                        <a:tabLst/>
+                        <a:defRPr/>
+                      </a:pPr>
+                      <a:r>
+                        <a:rPr lang="ko-KR" altLang="en-US" sz="1900" dirty="0">
+                          <a:solidFill>
+                            <a:schemeClr val="bg2">
+                              <a:lumMod val="25000"/>
+                            </a:schemeClr>
+                          </a:solidFill>
+                          <a:latin typeface="Arial" panose="020B0604020202020204" pitchFamily="34" charset="0"/>
+                          <a:cs typeface="Arial" panose="020B0604020202020204" pitchFamily="34" charset="0"/>
+                        </a:rPr>
+                        <a:t>장애인복지과</a:t>
+                      </a:r>
+                    </a:p>
+                  </a:txBody>
+                  <a:tcPr marL="97914" marR="97914" marT="48957" marB="48957" anchor="ctr">
+                    <a:lnL>
+                      <a:noFill/>
+                    </a:lnL>
+                    <a:lnR w="6350" cap="flat" cmpd="sng" algn="ctr">
+                      <a:solidFill>
+                        <a:schemeClr val="bg1">
+                          <a:lumMod val="65000"/>
+                        </a:schemeClr>
+                      </a:solidFill>
+                      <a:prstDash val="solid"/>
+                      <a:round/>
+                      <a:headEnd type="none" w="med" len="med"/>
+                      <a:tailEnd type="none" w="med" len="med"/>
+                    </a:lnR>
+                    <a:lnT w="6350" cap="flat" cmpd="sng" algn="ctr">
+                      <a:solidFill>
+                        <a:schemeClr val="bg1">
+                          <a:lumMod val="65000"/>
+                        </a:schemeClr>
+                      </a:solidFill>
+                      <a:prstDash val="solid"/>
+                      <a:round/>
+                      <a:headEnd type="none" w="med" len="med"/>
+                      <a:tailEnd type="none" w="med" len="med"/>
+                    </a:lnT>
+                    <a:lnB w="6350" cap="flat" cmpd="sng" algn="ctr">
+                      <a:solidFill>
+                        <a:schemeClr val="bg1">
+                          <a:lumMod val="75000"/>
+                        </a:schemeClr>
+                      </a:solidFill>
+                      <a:prstDash val="solid"/>
+                      <a:round/>
+                      <a:headEnd type="none" w="med" len="med"/>
+                      <a:tailEnd type="none" w="med" len="med"/>
+                    </a:lnB>
+                    <a:lnTlToBr w="12700" cmpd="sng">
+                      <a:noFill/>
+                      <a:prstDash val="solid"/>
+                    </a:lnTlToBr>
+                    <a:lnBlToTr w="12700" cmpd="sng">
+                      <a:noFill/>
+                      <a:prstDash val="solid"/>
+                    </a:lnBlToTr>
+                    <a:solidFill>
+                      <a:schemeClr val="bg1"/>
+                    </a:solidFill>
+                  </a:tcPr>
+                </a:tc>
+                <a:tc>
+                  <a:txBody>
+                    <a:bodyPr/>
+                    <a:lstStyle/>
+                    <a:p>
+                      <a:pPr algn="ctr" latinLnBrk="1"/>
+                      <a:r>
+                        <a:rPr lang="en-US" altLang="ko-KR" sz="1900" dirty="0">
+                          <a:solidFill>
+                            <a:schemeClr val="bg2">
+                              <a:lumMod val="25000"/>
+                            </a:schemeClr>
+                          </a:solidFill>
+                          <a:latin typeface="Arial" panose="020B0604020202020204" pitchFamily="34" charset="0"/>
+                          <a:cs typeface="Arial" panose="020B0604020202020204" pitchFamily="34" charset="0"/>
+                        </a:rPr>
+                        <a:t>389,638,560</a:t>
+                      </a:r>
+                      <a:endParaRPr lang="ko-KR" altLang="en-US" sz="1900" dirty="0">
+                        <a:solidFill>
+                          <a:schemeClr val="bg2">
+                            <a:lumMod val="25000"/>
+                          </a:schemeClr>
+                        </a:solidFill>
+                        <a:latin typeface="Arial" panose="020B0604020202020204" pitchFamily="34" charset="0"/>
+                        <a:cs typeface="Arial" panose="020B0604020202020204" pitchFamily="34" charset="0"/>
+                      </a:endParaRPr>
+                    </a:p>
+                  </a:txBody>
+                  <a:tcPr marL="97914" marR="97914" marT="48957" marB="48957" anchor="ctr">
+                    <a:lnL w="6350" cap="flat" cmpd="sng" algn="ctr">
+                      <a:solidFill>
+                        <a:schemeClr val="bg1">
+                          <a:lumMod val="65000"/>
+                        </a:schemeClr>
+                      </a:solidFill>
+                      <a:prstDash val="solid"/>
+                      <a:round/>
+                      <a:headEnd type="none" w="med" len="med"/>
+                      <a:tailEnd type="none" w="med" len="med"/>
+                    </a:lnL>
+                    <a:lnR w="6350" cap="flat" cmpd="sng" algn="ctr">
+                      <a:solidFill>
+                        <a:schemeClr val="bg1">
+                          <a:lumMod val="65000"/>
+                        </a:schemeClr>
+                      </a:solidFill>
+                      <a:prstDash val="solid"/>
+                      <a:round/>
+                      <a:headEnd type="none" w="med" len="med"/>
+                      <a:tailEnd type="none" w="med" len="med"/>
+                    </a:lnR>
+                    <a:lnT w="6350" cap="flat" cmpd="sng" algn="ctr">
+                      <a:solidFill>
+                        <a:schemeClr val="bg1">
+                          <a:lumMod val="65000"/>
+                        </a:schemeClr>
+                      </a:solidFill>
+                      <a:prstDash val="solid"/>
+                      <a:round/>
+                      <a:headEnd type="none" w="med" len="med"/>
+                      <a:tailEnd type="none" w="med" len="med"/>
+                    </a:lnT>
+                    <a:lnB w="6350" cap="flat" cmpd="sng" algn="ctr">
+                      <a:solidFill>
+                        <a:schemeClr val="bg1">
+                          <a:lumMod val="75000"/>
+                        </a:schemeClr>
+                      </a:solidFill>
+                      <a:prstDash val="solid"/>
+                      <a:round/>
+                      <a:headEnd type="none" w="med" len="med"/>
+                      <a:tailEnd type="none" w="med" len="med"/>
+                    </a:lnB>
+                    <a:lnTlToBr w="12700" cmpd="sng">
+                      <a:noFill/>
+                      <a:prstDash val="solid"/>
+                    </a:lnTlToBr>
+                    <a:lnBlToTr w="12700" cmpd="sng">
+                      <a:noFill/>
+                      <a:prstDash val="solid"/>
+                    </a:lnBlToTr>
+                    <a:solidFill>
+                      <a:schemeClr val="bg1"/>
+                    </a:solidFill>
+                  </a:tcPr>
+                </a:tc>
+                <a:tc>
+                  <a:txBody>
+                    <a:bodyPr/>
+                    <a:lstStyle/>
+                    <a:p>
+                      <a:pPr algn="ctr" latinLnBrk="1"/>
+                      <a:r>
+                        <a:rPr lang="en-US" altLang="ko-KR" sz="1900" dirty="0">
+                          <a:solidFill>
+                            <a:schemeClr val="bg2">
+                              <a:lumMod val="25000"/>
+                            </a:schemeClr>
+                          </a:solidFill>
+                          <a:latin typeface="Arial" panose="020B0604020202020204" pitchFamily="34" charset="0"/>
+                          <a:cs typeface="Arial" panose="020B0604020202020204" pitchFamily="34" charset="0"/>
+                        </a:rPr>
+                        <a:t>354,356,724</a:t>
+                      </a:r>
+                      <a:endParaRPr lang="ko-KR" altLang="en-US" sz="1900" dirty="0">
+                        <a:solidFill>
+                          <a:schemeClr val="bg2">
+                            <a:lumMod val="25000"/>
+                          </a:schemeClr>
+                        </a:solidFill>
+                        <a:latin typeface="Arial" panose="020B0604020202020204" pitchFamily="34" charset="0"/>
+                        <a:cs typeface="Arial" panose="020B0604020202020204" pitchFamily="34" charset="0"/>
+                      </a:endParaRPr>
+                    </a:p>
+                  </a:txBody>
+                  <a:tcPr marL="97914" marR="97914" marT="48957" marB="48957" anchor="ctr">
+                    <a:lnL w="6350" cap="flat" cmpd="sng" algn="ctr">
+                      <a:solidFill>
+                        <a:schemeClr val="bg1">
+                          <a:lumMod val="65000"/>
+                        </a:schemeClr>
+                      </a:solidFill>
+                      <a:prstDash val="solid"/>
+                      <a:round/>
+                      <a:headEnd type="none" w="med" len="med"/>
+                      <a:tailEnd type="none" w="med" len="med"/>
+                    </a:lnL>
+                    <a:lnR w="6350" cap="flat" cmpd="sng" algn="ctr">
+                      <a:solidFill>
+                        <a:schemeClr val="bg1">
+                          <a:lumMod val="65000"/>
+                        </a:schemeClr>
+                      </a:solidFill>
+                      <a:prstDash val="solid"/>
+                      <a:round/>
+                      <a:headEnd type="none" w="med" len="med"/>
+                      <a:tailEnd type="none" w="med" len="med"/>
+                    </a:lnR>
+                    <a:lnT w="6350" cap="flat" cmpd="sng" algn="ctr">
+                      <a:solidFill>
+                        <a:schemeClr val="bg1">
+                          <a:lumMod val="65000"/>
+                        </a:schemeClr>
+                      </a:solidFill>
+                      <a:prstDash val="solid"/>
+                      <a:round/>
+                      <a:headEnd type="none" w="med" len="med"/>
+                      <a:tailEnd type="none" w="med" len="med"/>
+                    </a:lnT>
+                    <a:lnB w="6350" cap="flat" cmpd="sng" algn="ctr">
+                      <a:solidFill>
+                        <a:schemeClr val="bg1">
+                          <a:lumMod val="75000"/>
+                        </a:schemeClr>
+                      </a:solidFill>
+                      <a:prstDash val="solid"/>
+                      <a:round/>
+                      <a:headEnd type="none" w="med" len="med"/>
+                      <a:tailEnd type="none" w="med" len="med"/>
+                    </a:lnB>
+                    <a:lnTlToBr w="12700" cmpd="sng">
+                      <a:noFill/>
+                      <a:prstDash val="solid"/>
+                    </a:lnTlToBr>
+                    <a:lnBlToTr w="12700" cmpd="sng">
+                      <a:noFill/>
+                      <a:prstDash val="solid"/>
+                    </a:lnBlToTr>
+                    <a:solidFill>
+                      <a:schemeClr val="bg1"/>
+                    </a:solidFill>
+                  </a:tcPr>
+                </a:tc>
+                <a:tc>
+                  <a:txBody>
+                    <a:bodyPr/>
+                    <a:lstStyle/>
+                    <a:p>
+                      <a:pPr algn="ctr" latinLnBrk="1"/>
+                      <a:r>
+                        <a:rPr lang="en-US" altLang="ko-KR" sz="1900" dirty="0">
+                          <a:solidFill>
+                            <a:schemeClr val="bg2">
+                              <a:lumMod val="25000"/>
+                            </a:schemeClr>
+                          </a:solidFill>
+                          <a:latin typeface="Arial" panose="020B0604020202020204" pitchFamily="34" charset="0"/>
+                          <a:cs typeface="Arial" panose="020B0604020202020204" pitchFamily="34" charset="0"/>
+                        </a:rPr>
+                        <a:t>9.96%</a:t>
+                      </a:r>
+                      <a:endParaRPr lang="ko-KR" altLang="en-US" sz="1900" dirty="0">
+                        <a:solidFill>
+                          <a:schemeClr val="bg2">
+                            <a:lumMod val="25000"/>
+                          </a:schemeClr>
+                        </a:solidFill>
+                        <a:latin typeface="Arial" panose="020B0604020202020204" pitchFamily="34" charset="0"/>
+                        <a:cs typeface="Arial" panose="020B0604020202020204" pitchFamily="34" charset="0"/>
+                      </a:endParaRPr>
+                    </a:p>
+                  </a:txBody>
+                  <a:tcPr marL="97914" marR="97914" marT="48957" marB="48957" anchor="ctr">
+                    <a:lnL w="6350" cap="flat" cmpd="sng" algn="ctr">
+                      <a:solidFill>
+                        <a:schemeClr val="bg1">
+                          <a:lumMod val="65000"/>
+                        </a:schemeClr>
+                      </a:solidFill>
+                      <a:prstDash val="solid"/>
+                      <a:round/>
+                      <a:headEnd type="none" w="med" len="med"/>
+                      <a:tailEnd type="none" w="med" len="med"/>
+                    </a:lnL>
+                    <a:lnR w="6350" cap="flat" cmpd="sng" algn="ctr">
+                      <a:noFill/>
+                      <a:prstDash val="solid"/>
+                      <a:round/>
+                      <a:headEnd type="none" w="med" len="med"/>
+                      <a:tailEnd type="none" w="med" len="med"/>
+                    </a:lnR>
+                    <a:lnT w="6350" cap="flat" cmpd="sng" algn="ctr">
+                      <a:solidFill>
+                        <a:schemeClr val="bg1">
+                          <a:lumMod val="65000"/>
+                        </a:schemeClr>
+                      </a:solidFill>
+                      <a:prstDash val="solid"/>
+                      <a:round/>
+                      <a:headEnd type="none" w="med" len="med"/>
+                      <a:tailEnd type="none" w="med" len="med"/>
+                    </a:lnT>
+                    <a:lnB w="6350" cap="flat" cmpd="sng" algn="ctr">
+                      <a:solidFill>
+                        <a:schemeClr val="bg1">
+                          <a:lumMod val="75000"/>
+                        </a:schemeClr>
+                      </a:solidFill>
+                      <a:prstDash val="solid"/>
+                      <a:round/>
+                      <a:headEnd type="none" w="med" len="med"/>
+                      <a:tailEnd type="none" w="med" len="med"/>
+                    </a:lnB>
+                    <a:lnTlToBr w="12700" cmpd="sng">
+                      <a:noFill/>
+                      <a:prstDash val="solid"/>
+                    </a:lnTlToBr>
+                    <a:lnBlToTr w="12700" cmpd="sng">
+                      <a:noFill/>
+                      <a:prstDash val="solid"/>
+                    </a:lnBlToTr>
+                    <a:solidFill>
+                      <a:schemeClr val="bg1"/>
+                    </a:solidFill>
+                  </a:tcPr>
+                </a:tc>
+                <a:extLst>
+                  <a:ext uri="{0D108BD9-81ED-4DB2-BD59-A6C34878D82A}">
+                    <a16:rowId xmlns:a16="http://schemas.microsoft.com/office/drawing/2014/main" val="10005"/>
+                  </a:ext>
+                </a:extLst>
+              </a:tr>
+            </a:tbl>
+          </a:graphicData>
+        </a:graphic>
+      </p:graphicFrame>
     </p:spTree>
     <p:extLst>
       <p:ext uri="{BB962C8B-B14F-4D97-AF65-F5344CB8AC3E}">

</xml_diff>